<commit_message>
Commented out the line between points
</commit_message>
<xml_diff>
--- a/Präsentation/slides.pptx
+++ b/Präsentation/slides.pptx
@@ -3229,8 +3229,8 @@
           <p:nvPr/>
         </p:nvSpPr>
         <p:spPr>
-          <a:xfrm flipH="1" flipV="1">
-            <a:off x="2965032" y="1946822"/>
+          <a:xfrm rot="-3960000" flipH="1" flipV="1">
+            <a:off x="7360519" y="6632053"/>
             <a:ext cx="658813" cy="1445172"/>
           </a:xfrm>
           <a:prstGeom prst="line">
@@ -3262,8 +3262,8 @@
           <p:nvPr/>
         </p:nvSpPr>
         <p:spPr>
-          <a:xfrm flipH="1" flipV="1">
-            <a:off x="2514005" y="2418628"/>
+          <a:xfrm rot="6300000" flipH="1" flipV="1">
+            <a:off x="7689924" y="6716000"/>
             <a:ext cx="495252" cy="1848248"/>
           </a:xfrm>
           <a:prstGeom prst="line">
@@ -3297,8 +3297,8 @@
           <p:nvPr/>
         </p:nvSpPr>
         <p:spPr>
-          <a:xfrm flipH="1" flipV="1">
-            <a:off x="2498824" y="2473848"/>
+          <a:xfrm rot="5580000" flipH="1" flipV="1">
+            <a:off x="7975668" y="6867037"/>
             <a:ext cx="118760" cy="2105120"/>
           </a:xfrm>
           <a:prstGeom prst="line">

</xml_diff>

<commit_message>
Created motivation plots new
</commit_message>
<xml_diff>
--- a/Präsentation/slides.pptx
+++ b/Präsentation/slides.pptx
@@ -99,6 +99,11 @@
       </a:defRPr>
     </a:lvl9pPr>
   </p:defaultTextStyle>
+  <p:extLst>
+    <p:ext uri="{EFAFB233-063F-42B5-8137-9DF3F51BA10A}">
+      <p15:sldGuideLst xmlns:p15="http://schemas.microsoft.com/office/powerpoint/2012/main"/>
+    </p:ext>
+  </p:extLst>
 </p:presentation>
 </file>
 
@@ -2756,13 +2761,19 @@
       </p:sp>
       <p:pic>
         <p:nvPicPr>
-          <p:cNvPr id="42" name="n=1000_error=0__0.11981.png"/>
-          <p:cNvPicPr/>
+          <p:cNvPr id="7" name="Bild 6"/>
+          <p:cNvPicPr>
+            <a:picLocks noChangeAspect="1"/>
+          </p:cNvPicPr>
           <p:nvPr/>
         </p:nvPicPr>
         <p:blipFill>
           <a:blip r:embed="rId2">
-            <a:extLst/>
+            <a:extLst>
+              <a:ext uri="{28A0092B-C50C-407E-A947-70E740481C1C}">
+                <a14:useLocalDpi xmlns:a14="http://schemas.microsoft.com/office/drawing/2010/main" val="0"/>
+              </a:ext>
+            </a:extLst>
           </a:blip>
           <a:stretch>
             <a:fillRect/>
@@ -2770,15 +2781,12 @@
         </p:blipFill>
         <p:spPr>
           <a:xfrm>
-            <a:off x="6240363" y="2415331"/>
-            <a:ext cx="5863281" cy="4397461"/>
+            <a:off x="5940658" y="2268367"/>
+            <a:ext cx="6346216" cy="4759663"/>
           </a:xfrm>
           <a:prstGeom prst="rect">
             <a:avLst/>
           </a:prstGeom>
-          <a:ln w="12700">
-            <a:miter lim="400000"/>
-          </a:ln>
         </p:spPr>
       </p:pic>
     </p:spTree>
@@ -3384,114 +3392,6 @@
           </a:p>
         </p:txBody>
       </p:sp>
-      <p:pic>
-        <p:nvPicPr>
-          <p:cNvPr id="57" name="n=100_error=0__0.22828.png"/>
-          <p:cNvPicPr/>
-          <p:nvPr/>
-        </p:nvPicPr>
-        <p:blipFill>
-          <a:blip r:embed="rId2">
-            <a:extLst/>
-          </a:blip>
-          <a:stretch>
-            <a:fillRect/>
-          </a:stretch>
-        </p:blipFill>
-        <p:spPr>
-          <a:xfrm>
-            <a:off x="1291201" y="1701800"/>
-            <a:ext cx="4715082" cy="3536311"/>
-          </a:xfrm>
-          <a:prstGeom prst="rect">
-            <a:avLst/>
-          </a:prstGeom>
-          <a:ln w="12700">
-            <a:miter lim="400000"/>
-          </a:ln>
-        </p:spPr>
-      </p:pic>
-      <p:pic>
-        <p:nvPicPr>
-          <p:cNvPr id="58" name="n=100_error&gt;0__0.28122.png"/>
-          <p:cNvPicPr/>
-          <p:nvPr/>
-        </p:nvPicPr>
-        <p:blipFill>
-          <a:blip r:embed="rId3">
-            <a:extLst/>
-          </a:blip>
-          <a:stretch>
-            <a:fillRect/>
-          </a:stretch>
-        </p:blipFill>
-        <p:spPr>
-          <a:xfrm>
-            <a:off x="7279540" y="1701800"/>
-            <a:ext cx="4715082" cy="3536311"/>
-          </a:xfrm>
-          <a:prstGeom prst="rect">
-            <a:avLst/>
-          </a:prstGeom>
-          <a:ln w="12700">
-            <a:miter lim="400000"/>
-          </a:ln>
-        </p:spPr>
-      </p:pic>
-      <p:pic>
-        <p:nvPicPr>
-          <p:cNvPr id="59" name="n=1000_error=0__0.11981.png"/>
-          <p:cNvPicPr/>
-          <p:nvPr/>
-        </p:nvPicPr>
-        <p:blipFill>
-          <a:blip r:embed="rId4">
-            <a:extLst/>
-          </a:blip>
-          <a:stretch>
-            <a:fillRect/>
-          </a:stretch>
-        </p:blipFill>
-        <p:spPr>
-          <a:xfrm>
-            <a:off x="1291201" y="5577627"/>
-            <a:ext cx="4715082" cy="3536312"/>
-          </a:xfrm>
-          <a:prstGeom prst="rect">
-            <a:avLst/>
-          </a:prstGeom>
-          <a:ln w="12700">
-            <a:miter lim="400000"/>
-          </a:ln>
-        </p:spPr>
-      </p:pic>
-      <p:pic>
-        <p:nvPicPr>
-          <p:cNvPr id="60" name="n=1000_error&gt;0__0.13468.png"/>
-          <p:cNvPicPr/>
-          <p:nvPr/>
-        </p:nvPicPr>
-        <p:blipFill>
-          <a:blip r:embed="rId5">
-            <a:extLst/>
-          </a:blip>
-          <a:stretch>
-            <a:fillRect/>
-          </a:stretch>
-        </p:blipFill>
-        <p:spPr>
-          <a:xfrm>
-            <a:off x="7279540" y="5666527"/>
-            <a:ext cx="4715082" cy="3536312"/>
-          </a:xfrm>
-          <a:prstGeom prst="rect">
-            <a:avLst/>
-          </a:prstGeom>
-          <a:ln w="12700">
-            <a:miter lim="400000"/>
-          </a:ln>
-        </p:spPr>
-      </p:pic>
       <p:sp>
         <p:nvSpPr>
           <p:cNvPr id="61" name="Shape 61"/>
@@ -3500,8 +3400,8 @@
         </p:nvSpPr>
         <p:spPr>
           <a:xfrm>
-            <a:off x="2765431" y="5175250"/>
-            <a:ext cx="1766622" cy="647701"/>
+            <a:off x="2763885" y="5170806"/>
+            <a:ext cx="1769716" cy="656590"/>
           </a:xfrm>
           <a:prstGeom prst="rect">
             <a:avLst/>
@@ -3525,9 +3425,10 @@
               <a:defRPr sz="1800"/>
             </a:pPr>
             <a:r>
-              <a:rPr sz="3600"/>
-              <a:t>0.22828</a:t>
-            </a:r>
+              <a:rPr lang="de-DE" sz="3600" dirty="0" smtClean="0"/>
+              <a:t>0.20950</a:t>
+            </a:r>
+            <a:endParaRPr sz="3600" dirty="0"/>
           </a:p>
         </p:txBody>
       </p:sp>
@@ -3539,8 +3440,8 @@
         </p:nvSpPr>
         <p:spPr>
           <a:xfrm>
-            <a:off x="8753771" y="5175250"/>
-            <a:ext cx="1766621" cy="647701"/>
+            <a:off x="8803520" y="5222101"/>
+            <a:ext cx="1667123" cy="553998"/>
           </a:xfrm>
           <a:prstGeom prst="rect">
             <a:avLst/>
@@ -3564,9 +3465,10 @@
               <a:defRPr sz="1800"/>
             </a:pPr>
             <a:r>
-              <a:rPr sz="3600"/>
-              <a:t>0.28122</a:t>
-            </a:r>
+              <a:rPr lang="de-DE" sz="3600" dirty="0" smtClean="0"/>
+              <a:t>0.26697</a:t>
+            </a:r>
+            <a:endParaRPr sz="3600" dirty="0"/>
           </a:p>
         </p:txBody>
       </p:sp>
@@ -3578,8 +3480,8 @@
         </p:nvSpPr>
         <p:spPr>
           <a:xfrm>
-            <a:off x="2765431" y="9004300"/>
-            <a:ext cx="1766622" cy="647701"/>
+            <a:off x="2815181" y="9051151"/>
+            <a:ext cx="1667123" cy="553998"/>
           </a:xfrm>
           <a:prstGeom prst="rect">
             <a:avLst/>
@@ -3603,9 +3505,10 @@
               <a:defRPr sz="1800"/>
             </a:pPr>
             <a:r>
-              <a:rPr sz="3600"/>
-              <a:t>0.11981</a:t>
-            </a:r>
+              <a:rPr lang="de-DE" sz="3600" dirty="0" smtClean="0"/>
+              <a:t>0.12684</a:t>
+            </a:r>
+            <a:endParaRPr sz="3600" dirty="0"/>
           </a:p>
         </p:txBody>
       </p:sp>
@@ -3617,8 +3520,8 @@
         </p:nvSpPr>
         <p:spPr>
           <a:xfrm>
-            <a:off x="8753771" y="9004300"/>
-            <a:ext cx="1766621" cy="647701"/>
+            <a:off x="8803520" y="9051151"/>
+            <a:ext cx="1667123" cy="553998"/>
           </a:xfrm>
           <a:prstGeom prst="rect">
             <a:avLst/>
@@ -3642,12 +3545,133 @@
               <a:defRPr sz="1800"/>
             </a:pPr>
             <a:r>
-              <a:rPr sz="3600"/>
-              <a:t>0.13468</a:t>
-            </a:r>
+              <a:rPr lang="de-DE" sz="3600" dirty="0" smtClean="0"/>
+              <a:t>0.15181</a:t>
+            </a:r>
+            <a:endParaRPr sz="3600" dirty="0"/>
           </a:p>
         </p:txBody>
       </p:sp>
+      <p:pic>
+        <p:nvPicPr>
+          <p:cNvPr id="2" name="Bild 1"/>
+          <p:cNvPicPr>
+            <a:picLocks noChangeAspect="1"/>
+          </p:cNvPicPr>
+          <p:nvPr/>
+        </p:nvPicPr>
+        <p:blipFill>
+          <a:blip r:embed="rId2">
+            <a:extLst>
+              <a:ext uri="{28A0092B-C50C-407E-A947-70E740481C1C}">
+                <a14:useLocalDpi xmlns:a14="http://schemas.microsoft.com/office/drawing/2010/main" val="0"/>
+              </a:ext>
+            </a:extLst>
+          </a:blip>
+          <a:stretch>
+            <a:fillRect/>
+          </a:stretch>
+        </p:blipFill>
+        <p:spPr>
+          <a:xfrm>
+            <a:off x="1690268" y="2166019"/>
+            <a:ext cx="3916946" cy="2937710"/>
+          </a:xfrm>
+          <a:prstGeom prst="rect">
+            <a:avLst/>
+          </a:prstGeom>
+        </p:spPr>
+      </p:pic>
+      <p:pic>
+        <p:nvPicPr>
+          <p:cNvPr id="3" name="Bild 2"/>
+          <p:cNvPicPr>
+            <a:picLocks noChangeAspect="1"/>
+          </p:cNvPicPr>
+          <p:nvPr/>
+        </p:nvPicPr>
+        <p:blipFill>
+          <a:blip r:embed="rId3">
+            <a:extLst>
+              <a:ext uri="{28A0092B-C50C-407E-A947-70E740481C1C}">
+                <a14:useLocalDpi xmlns:a14="http://schemas.microsoft.com/office/drawing/2010/main" val="0"/>
+              </a:ext>
+            </a:extLst>
+          </a:blip>
+          <a:stretch>
+            <a:fillRect/>
+          </a:stretch>
+        </p:blipFill>
+        <p:spPr>
+          <a:xfrm>
+            <a:off x="7678606" y="2165718"/>
+            <a:ext cx="3916947" cy="2937710"/>
+          </a:xfrm>
+          <a:prstGeom prst="rect">
+            <a:avLst/>
+          </a:prstGeom>
+        </p:spPr>
+      </p:pic>
+      <p:pic>
+        <p:nvPicPr>
+          <p:cNvPr id="4" name="Bild 3"/>
+          <p:cNvPicPr>
+            <a:picLocks noChangeAspect="1"/>
+          </p:cNvPicPr>
+          <p:nvPr/>
+        </p:nvPicPr>
+        <p:blipFill>
+          <a:blip r:embed="rId4">
+            <a:extLst>
+              <a:ext uri="{28A0092B-C50C-407E-A947-70E740481C1C}">
+                <a14:useLocalDpi xmlns:a14="http://schemas.microsoft.com/office/drawing/2010/main" val="0"/>
+              </a:ext>
+            </a:extLst>
+          </a:blip>
+          <a:stretch>
+            <a:fillRect/>
+          </a:stretch>
+        </p:blipFill>
+        <p:spPr>
+          <a:xfrm>
+            <a:off x="7678607" y="5817938"/>
+            <a:ext cx="3916947" cy="2937710"/>
+          </a:xfrm>
+          <a:prstGeom prst="rect">
+            <a:avLst/>
+          </a:prstGeom>
+        </p:spPr>
+      </p:pic>
+      <p:pic>
+        <p:nvPicPr>
+          <p:cNvPr id="5" name="Bild 4"/>
+          <p:cNvPicPr>
+            <a:picLocks noChangeAspect="1"/>
+          </p:cNvPicPr>
+          <p:nvPr/>
+        </p:nvPicPr>
+        <p:blipFill>
+          <a:blip r:embed="rId5">
+            <a:extLst>
+              <a:ext uri="{28A0092B-C50C-407E-A947-70E740481C1C}">
+                <a14:useLocalDpi xmlns:a14="http://schemas.microsoft.com/office/drawing/2010/main" val="0"/>
+              </a:ext>
+            </a:extLst>
+          </a:blip>
+          <a:stretch>
+            <a:fillRect/>
+          </a:stretch>
+        </p:blipFill>
+        <p:spPr>
+          <a:xfrm>
+            <a:off x="1690268" y="5761455"/>
+            <a:ext cx="3916947" cy="2937710"/>
+          </a:xfrm>
+          <a:prstGeom prst="rect">
+            <a:avLst/>
+          </a:prstGeom>
+        </p:spPr>
+      </p:pic>
     </p:spTree>
   </p:cSld>
   <p:clrMapOvr>
@@ -3882,13 +3906,19 @@
       </p:sp>
       <p:pic>
         <p:nvPicPr>
-          <p:cNvPr id="73" name="n=100_error=0__0.22828.png"/>
-          <p:cNvPicPr/>
+          <p:cNvPr id="4" name="Bild 3"/>
+          <p:cNvPicPr>
+            <a:picLocks noChangeAspect="1"/>
+          </p:cNvPicPr>
           <p:nvPr/>
         </p:nvPicPr>
         <p:blipFill>
           <a:blip r:embed="rId2">
-            <a:extLst/>
+            <a:extLst>
+              <a:ext uri="{28A0092B-C50C-407E-A947-70E740481C1C}">
+                <a14:useLocalDpi xmlns:a14="http://schemas.microsoft.com/office/drawing/2010/main" val="0"/>
+              </a:ext>
+            </a:extLst>
           </a:blip>
           <a:stretch>
             <a:fillRect/>
@@ -3896,15 +3926,12 @@
         </p:blipFill>
         <p:spPr>
           <a:xfrm>
-            <a:off x="1888089" y="133367"/>
-            <a:ext cx="9228622" cy="6921466"/>
+            <a:off x="1918374" y="212932"/>
+            <a:ext cx="9168052" cy="6876038"/>
           </a:xfrm>
           <a:prstGeom prst="rect">
             <a:avLst/>
           </a:prstGeom>
-          <a:ln w="12700">
-            <a:miter lim="400000"/>
-          </a:ln>
         </p:spPr>
       </p:pic>
     </p:spTree>

</xml_diff>

<commit_message>
New presentation and included regression
</commit_message>
<xml_diff>
--- a/Präsentation/slides.pptx
+++ b/Präsentation/slides.pptx
@@ -295,6 +295,67 @@
     </a:lvl9pPr>
   </p:notesStyle>
 </p:notesMaster>
+</file>
+
+<file path=ppt/notesSlides/notesSlide1.xml><?xml version="1.0" encoding="utf-8"?>
+<p:notes xmlns:a="http://schemas.openxmlformats.org/drawingml/2006/main" xmlns:r="http://schemas.openxmlformats.org/officeDocument/2006/relationships" xmlns:p="http://schemas.openxmlformats.org/presentationml/2006/main">
+  <p:cSld>
+    <p:spTree>
+      <p:nvGrpSpPr>
+        <p:cNvPr id="1" name=""/>
+        <p:cNvGrpSpPr/>
+        <p:nvPr/>
+      </p:nvGrpSpPr>
+      <p:grpSpPr>
+        <a:xfrm>
+          <a:off x="0" y="0"/>
+          <a:ext cx="0" cy="0"/>
+          <a:chOff x="0" y="0"/>
+          <a:chExt cx="0" cy="0"/>
+        </a:xfrm>
+      </p:grpSpPr>
+      <p:sp>
+        <p:nvSpPr>
+          <p:cNvPr id="2" name="Folienbildplatzhalter 1"/>
+          <p:cNvSpPr>
+            <a:spLocks noGrp="1" noRot="1" noChangeAspect="1"/>
+          </p:cNvSpPr>
+          <p:nvPr>
+            <p:ph type="sldImg"/>
+          </p:nvPr>
+        </p:nvSpPr>
+        <p:spPr/>
+      </p:sp>
+      <p:sp>
+        <p:nvSpPr>
+          <p:cNvPr id="3" name="Notizenplatzhalter 2"/>
+          <p:cNvSpPr>
+            <a:spLocks noGrp="1"/>
+          </p:cNvSpPr>
+          <p:nvPr>
+            <p:ph type="body" idx="1"/>
+          </p:nvPr>
+        </p:nvSpPr>
+        <p:spPr/>
+        <p:txBody>
+          <a:bodyPr/>
+          <a:lstStyle/>
+          <a:p>
+            <a:endParaRPr lang="de-DE" dirty="0"/>
+          </a:p>
+        </p:txBody>
+      </p:sp>
+    </p:spTree>
+    <p:extLst>
+      <p:ext uri="{BB962C8B-B14F-4D97-AF65-F5344CB8AC3E}">
+        <p14:creationId xmlns:p14="http://schemas.microsoft.com/office/powerpoint/2010/main" val="2014748561"/>
+      </p:ext>
+    </p:extLst>
+  </p:cSld>
+  <p:clrMapOvr>
+    <a:masterClrMapping/>
+  </p:clrMapOvr>
+</p:notes>
 </file>
 
 <file path=ppt/slideLayouts/slideLayout1.xml><?xml version="1.0" encoding="utf-8"?>
@@ -1981,14 +2042,16 @@
           </a:prstGeom>
         </p:spPr>
         <p:txBody>
-          <a:bodyPr/>
+          <a:bodyPr>
+            <a:normAutofit/>
+          </a:bodyPr>
           <a:lstStyle/>
           <a:p>
             <a:pPr lvl="0">
               <a:defRPr sz="1800"/>
             </a:pPr>
             <a:r>
-              <a:rPr sz="8000"/>
+              <a:rPr sz="6000" dirty="0"/>
               <a:t>C parameter</a:t>
             </a:r>
           </a:p>
@@ -2010,8 +2073,8 @@
         </p:blipFill>
         <p:spPr>
           <a:xfrm>
-            <a:off x="1422400" y="2089497"/>
-            <a:ext cx="10160000" cy="7620001"/>
+            <a:off x="628770" y="3797527"/>
+            <a:ext cx="5582249" cy="4186687"/>
           </a:xfrm>
           <a:prstGeom prst="rect">
             <a:avLst/>
@@ -2021,6 +2084,292 @@
           </a:ln>
         </p:spPr>
       </p:pic>
+      <p:sp>
+        <p:nvSpPr>
+          <p:cNvPr id="6" name="Textfeld 5"/>
+          <p:cNvSpPr txBox="1"/>
+          <p:nvPr/>
+        </p:nvSpPr>
+        <p:spPr>
+          <a:xfrm>
+            <a:off x="3035403" y="2603500"/>
+            <a:ext cx="1384995" cy="656590"/>
+          </a:xfrm>
+          <a:prstGeom prst="rect">
+            <a:avLst/>
+          </a:prstGeom>
+          <a:noFill/>
+          <a:ln w="12700" cap="flat">
+            <a:noFill/>
+            <a:miter lim="400000"/>
+          </a:ln>
+          <a:effectLst/>
+        </p:spPr>
+        <p:style>
+          <a:lnRef idx="0">
+            <a:scrgbClr r="0" g="0" b="0"/>
+          </a:lnRef>
+          <a:fillRef idx="0">
+            <a:scrgbClr r="0" g="0" b="0"/>
+          </a:fillRef>
+          <a:effectRef idx="0">
+            <a:scrgbClr r="0" g="0" b="0"/>
+          </a:effectRef>
+          <a:fontRef idx="none"/>
+        </p:style>
+        <p:txBody>
+          <a:bodyPr rot="0" spcFirstLastPara="1" vertOverflow="overflow" horzOverflow="overflow" vert="horz" wrap="none" lIns="50800" tIns="50800" rIns="50800" bIns="50800" numCol="1" spcCol="38100" rtlCol="0" anchor="ctr">
+            <a:spAutoFit/>
+          </a:bodyPr>
+          <a:lstStyle/>
+          <a:p>
+            <a:pPr marL="0" marR="0" indent="0" algn="ctr" defTabSz="584200" rtl="0" fontAlgn="auto" latinLnBrk="1" hangingPunct="0">
+              <a:lnSpc>
+                <a:spcPct val="100000"/>
+              </a:lnSpc>
+              <a:spcBef>
+                <a:spcPts val="0"/>
+              </a:spcBef>
+              <a:spcAft>
+                <a:spcPts val="0"/>
+              </a:spcAft>
+              <a:buClrTx/>
+              <a:buSzTx/>
+              <a:buFontTx/>
+              <a:buNone/>
+              <a:tabLst/>
+            </a:pPr>
+            <a:r>
+              <a:rPr kumimoji="0" lang="de-DE" sz="3600" b="0" i="0" u="none" strike="noStrike" cap="none" spc="0" normalizeH="0" baseline="0" dirty="0" smtClean="0">
+                <a:ln>
+                  <a:noFill/>
+                </a:ln>
+                <a:solidFill>
+                  <a:srgbClr val="000000"/>
+                </a:solidFill>
+                <a:effectLst/>
+                <a:uFillTx/>
+                <a:latin typeface="+mn-lt"/>
+                <a:ea typeface="+mn-ea"/>
+                <a:cs typeface="+mn-cs"/>
+                <a:sym typeface="Helvetica Light"/>
+              </a:rPr>
+              <a:t>Linear</a:t>
+            </a:r>
+            <a:endParaRPr kumimoji="0" lang="de-DE" sz="3600" b="0" i="0" u="none" strike="noStrike" cap="none" spc="0" normalizeH="0" baseline="0" dirty="0">
+              <a:ln>
+                <a:noFill/>
+              </a:ln>
+              <a:solidFill>
+                <a:srgbClr val="000000"/>
+              </a:solidFill>
+              <a:effectLst/>
+              <a:uFillTx/>
+              <a:latin typeface="+mn-lt"/>
+              <a:ea typeface="+mn-ea"/>
+              <a:cs typeface="+mn-cs"/>
+              <a:sym typeface="Helvetica Light"/>
+            </a:endParaRPr>
+          </a:p>
+        </p:txBody>
+      </p:sp>
+      <p:sp>
+        <p:nvSpPr>
+          <p:cNvPr id="7" name="Textfeld 6"/>
+          <p:cNvSpPr txBox="1"/>
+          <p:nvPr/>
+        </p:nvSpPr>
+        <p:spPr>
+          <a:xfrm>
+            <a:off x="8635244" y="2638006"/>
+            <a:ext cx="2051845" cy="656590"/>
+          </a:xfrm>
+          <a:prstGeom prst="rect">
+            <a:avLst/>
+          </a:prstGeom>
+          <a:noFill/>
+          <a:ln w="12700" cap="flat">
+            <a:noFill/>
+            <a:miter lim="400000"/>
+          </a:ln>
+          <a:effectLst/>
+        </p:spPr>
+        <p:style>
+          <a:lnRef idx="0">
+            <a:scrgbClr r="0" g="0" b="0"/>
+          </a:lnRef>
+          <a:fillRef idx="0">
+            <a:scrgbClr r="0" g="0" b="0"/>
+          </a:fillRef>
+          <a:effectRef idx="0">
+            <a:scrgbClr r="0" g="0" b="0"/>
+          </a:effectRef>
+          <a:fontRef idx="none"/>
+        </p:style>
+        <p:txBody>
+          <a:bodyPr rot="0" spcFirstLastPara="1" vertOverflow="overflow" horzOverflow="overflow" vert="horz" wrap="none" lIns="50800" tIns="50800" rIns="50800" bIns="50800" numCol="1" spcCol="38100" rtlCol="0" anchor="ctr">
+            <a:spAutoFit/>
+          </a:bodyPr>
+          <a:lstStyle/>
+          <a:p>
+            <a:pPr marL="0" marR="0" indent="0" algn="ctr" defTabSz="584200" rtl="0" fontAlgn="auto" latinLnBrk="1" hangingPunct="0">
+              <a:lnSpc>
+                <a:spcPct val="100000"/>
+              </a:lnSpc>
+              <a:spcBef>
+                <a:spcPts val="0"/>
+              </a:spcBef>
+              <a:spcAft>
+                <a:spcPts val="0"/>
+              </a:spcAft>
+              <a:buClrTx/>
+              <a:buSzTx/>
+              <a:buFontTx/>
+              <a:buNone/>
+              <a:tabLst/>
+            </a:pPr>
+            <a:r>
+              <a:rPr kumimoji="0" lang="de-DE" sz="3600" b="0" i="0" u="none" strike="noStrike" cap="none" spc="0" normalizeH="0" baseline="0" dirty="0" err="1" smtClean="0">
+                <a:ln>
+                  <a:noFill/>
+                </a:ln>
+                <a:solidFill>
+                  <a:srgbClr val="000000"/>
+                </a:solidFill>
+                <a:effectLst/>
+                <a:uFillTx/>
+                <a:latin typeface="+mn-lt"/>
+                <a:ea typeface="+mn-ea"/>
+                <a:cs typeface="+mn-cs"/>
+                <a:sym typeface="Helvetica Light"/>
+              </a:rPr>
+              <a:t>Gaussian</a:t>
+            </a:r>
+            <a:endParaRPr kumimoji="0" lang="de-DE" sz="3600" b="0" i="0" u="none" strike="noStrike" cap="none" spc="0" normalizeH="0" baseline="0" dirty="0">
+              <a:ln>
+                <a:noFill/>
+              </a:ln>
+              <a:solidFill>
+                <a:srgbClr val="000000"/>
+              </a:solidFill>
+              <a:effectLst/>
+              <a:uFillTx/>
+              <a:latin typeface="+mn-lt"/>
+              <a:ea typeface="+mn-ea"/>
+              <a:cs typeface="+mn-cs"/>
+              <a:sym typeface="Helvetica Light"/>
+            </a:endParaRPr>
+          </a:p>
+        </p:txBody>
+      </p:sp>
+      <p:pic>
+        <p:nvPicPr>
+          <p:cNvPr id="2" name="Bild 1"/>
+          <p:cNvPicPr>
+            <a:picLocks noChangeAspect="1"/>
+          </p:cNvPicPr>
+          <p:nvPr/>
+        </p:nvPicPr>
+        <p:blipFill>
+          <a:blip r:embed="rId3">
+            <a:extLst>
+              <a:ext uri="{28A0092B-C50C-407E-A947-70E740481C1C}">
+                <a14:useLocalDpi xmlns:a14="http://schemas.microsoft.com/office/drawing/2010/main" val="0"/>
+              </a:ext>
+            </a:extLst>
+          </a:blip>
+          <a:stretch>
+            <a:fillRect/>
+          </a:stretch>
+        </p:blipFill>
+        <p:spPr>
+          <a:xfrm>
+            <a:off x="6729280" y="3858728"/>
+            <a:ext cx="5569857" cy="4064283"/>
+          </a:xfrm>
+          <a:prstGeom prst="rect">
+            <a:avLst/>
+          </a:prstGeom>
+        </p:spPr>
+      </p:pic>
+      <p:sp>
+        <p:nvSpPr>
+          <p:cNvPr id="3" name="Rechteck 2"/>
+          <p:cNvSpPr/>
+          <p:nvPr/>
+        </p:nvSpPr>
+        <p:spPr>
+          <a:xfrm>
+            <a:off x="8017329" y="4980214"/>
+            <a:ext cx="473528" cy="2286000"/>
+          </a:xfrm>
+          <a:prstGeom prst="rect">
+            <a:avLst/>
+          </a:prstGeom>
+          <a:blipFill rotWithShape="1">
+            <a:blip r:embed="rId4">
+              <a:biLevel thresh="25000"/>
+            </a:blip>
+            <a:srcRect/>
+            <a:tile tx="0" ty="0" sx="100000" sy="100000" flip="none" algn="tl"/>
+          </a:blipFill>
+          <a:ln w="12700" cap="flat">
+            <a:noFill/>
+            <a:miter lim="400000"/>
+          </a:ln>
+          <a:effectLst/>
+        </p:spPr>
+        <p:style>
+          <a:lnRef idx="0">
+            <a:scrgbClr r="0" g="0" b="0"/>
+          </a:lnRef>
+          <a:fillRef idx="0">
+            <a:scrgbClr r="0" g="0" b="0"/>
+          </a:fillRef>
+          <a:effectRef idx="0">
+            <a:scrgbClr r="0" g="0" b="0"/>
+          </a:effectRef>
+          <a:fontRef idx="none"/>
+        </p:style>
+        <p:txBody>
+          <a:bodyPr rot="0" spcFirstLastPara="1" vertOverflow="overflow" horzOverflow="overflow" vert="horz" wrap="square" lIns="50800" tIns="50800" rIns="50800" bIns="50800" numCol="1" spcCol="38100" rtlCol="0" anchor="ctr">
+            <a:spAutoFit/>
+          </a:bodyPr>
+          <a:lstStyle/>
+          <a:p>
+            <a:pPr marL="0" marR="0" indent="0" algn="ctr" defTabSz="584200" rtl="0" fontAlgn="auto" latinLnBrk="1" hangingPunct="0">
+              <a:lnSpc>
+                <a:spcPct val="100000"/>
+              </a:lnSpc>
+              <a:spcBef>
+                <a:spcPts val="0"/>
+              </a:spcBef>
+              <a:spcAft>
+                <a:spcPts val="0"/>
+              </a:spcAft>
+              <a:buClrTx/>
+              <a:buSzTx/>
+              <a:buFontTx/>
+              <a:buNone/>
+              <a:tabLst/>
+            </a:pPr>
+            <a:endParaRPr kumimoji="0" lang="de-DE" sz="2400" b="0" i="0" u="none" strike="noStrike" cap="none" spc="0" normalizeH="0" baseline="0">
+              <a:ln>
+                <a:noFill/>
+              </a:ln>
+              <a:solidFill>
+                <a:srgbClr val="FFFFFF"/>
+              </a:solidFill>
+              <a:effectLst/>
+              <a:uFillTx/>
+              <a:latin typeface="+mn-lt"/>
+              <a:ea typeface="+mn-ea"/>
+              <a:cs typeface="+mn-cs"/>
+              <a:sym typeface="Helvetica Light"/>
+            </a:endParaRPr>
+          </a:p>
+        </p:txBody>
+      </p:sp>
     </p:spTree>
   </p:cSld>
   <p:clrMapOvr>
@@ -2063,14 +2412,16 @@
           </a:prstGeom>
         </p:spPr>
         <p:txBody>
-          <a:bodyPr/>
+          <a:bodyPr>
+            <a:normAutofit/>
+          </a:bodyPr>
           <a:lstStyle/>
           <a:p>
             <a:pPr lvl="0">
               <a:defRPr sz="1800"/>
             </a:pPr>
             <a:r>
-              <a:rPr sz="8000"/>
+              <a:rPr sz="6000" dirty="0"/>
               <a:t>Balance of Data</a:t>
             </a:r>
           </a:p>
@@ -2078,13 +2429,19 @@
       </p:sp>
       <p:pic>
         <p:nvPicPr>
-          <p:cNvPr id="79" name="change_Balances_2016-06-24 21:36:55_n=500_replication=200_C=1_kernel=linear_data= dataSimulation([0.8, 0.7, 0.9, -0.3], 1, intercept, n).png"/>
-          <p:cNvPicPr/>
+          <p:cNvPr id="2" name="Bild 1"/>
+          <p:cNvPicPr>
+            <a:picLocks noChangeAspect="1"/>
+          </p:cNvPicPr>
           <p:nvPr/>
         </p:nvPicPr>
         <p:blipFill>
           <a:blip r:embed="rId2">
-            <a:extLst/>
+            <a:extLst>
+              <a:ext uri="{28A0092B-C50C-407E-A947-70E740481C1C}">
+                <a14:useLocalDpi xmlns:a14="http://schemas.microsoft.com/office/drawing/2010/main" val="0"/>
+              </a:ext>
+            </a:extLst>
           </a:blip>
           <a:stretch>
             <a:fillRect/>
@@ -2092,17 +2449,222 @@
         </p:blipFill>
         <p:spPr>
           <a:xfrm>
-            <a:off x="1422400" y="2259756"/>
-            <a:ext cx="10160000" cy="7620001"/>
+            <a:off x="6563323" y="3720859"/>
+            <a:ext cx="5873633" cy="4405225"/>
           </a:xfrm>
           <a:prstGeom prst="rect">
             <a:avLst/>
           </a:prstGeom>
-          <a:ln w="12700">
+        </p:spPr>
+      </p:pic>
+      <p:pic>
+        <p:nvPicPr>
+          <p:cNvPr id="3" name="Bild 2"/>
+          <p:cNvPicPr>
+            <a:picLocks noChangeAspect="1"/>
+          </p:cNvPicPr>
+          <p:nvPr/>
+        </p:nvPicPr>
+        <p:blipFill>
+          <a:blip r:embed="rId3">
+            <a:extLst>
+              <a:ext uri="{28A0092B-C50C-407E-A947-70E740481C1C}">
+                <a14:useLocalDpi xmlns:a14="http://schemas.microsoft.com/office/drawing/2010/main" val="0"/>
+              </a:ext>
+            </a:extLst>
+          </a:blip>
+          <a:stretch>
+            <a:fillRect/>
+          </a:stretch>
+        </p:blipFill>
+        <p:spPr>
+          <a:xfrm>
+            <a:off x="710961" y="3686354"/>
+            <a:ext cx="5722550" cy="4439730"/>
+          </a:xfrm>
+          <a:prstGeom prst="rect">
+            <a:avLst/>
+          </a:prstGeom>
+        </p:spPr>
+      </p:pic>
+      <p:sp>
+        <p:nvSpPr>
+          <p:cNvPr id="4" name="Textfeld 3"/>
+          <p:cNvSpPr txBox="1"/>
+          <p:nvPr/>
+        </p:nvSpPr>
+        <p:spPr>
+          <a:xfrm>
+            <a:off x="3035403" y="2603500"/>
+            <a:ext cx="1384995" cy="656590"/>
+          </a:xfrm>
+          <a:prstGeom prst="rect">
+            <a:avLst/>
+          </a:prstGeom>
+          <a:noFill/>
+          <a:ln w="12700" cap="flat">
+            <a:noFill/>
             <a:miter lim="400000"/>
           </a:ln>
+          <a:effectLst/>
         </p:spPr>
-      </p:pic>
+        <p:style>
+          <a:lnRef idx="0">
+            <a:scrgbClr r="0" g="0" b="0"/>
+          </a:lnRef>
+          <a:fillRef idx="0">
+            <a:scrgbClr r="0" g="0" b="0"/>
+          </a:fillRef>
+          <a:effectRef idx="0">
+            <a:scrgbClr r="0" g="0" b="0"/>
+          </a:effectRef>
+          <a:fontRef idx="none"/>
+        </p:style>
+        <p:txBody>
+          <a:bodyPr rot="0" spcFirstLastPara="1" vertOverflow="overflow" horzOverflow="overflow" vert="horz" wrap="none" lIns="50800" tIns="50800" rIns="50800" bIns="50800" numCol="1" spcCol="38100" rtlCol="0" anchor="ctr">
+            <a:spAutoFit/>
+          </a:bodyPr>
+          <a:lstStyle/>
+          <a:p>
+            <a:pPr marL="0" marR="0" indent="0" algn="ctr" defTabSz="584200" rtl="0" fontAlgn="auto" latinLnBrk="1" hangingPunct="0">
+              <a:lnSpc>
+                <a:spcPct val="100000"/>
+              </a:lnSpc>
+              <a:spcBef>
+                <a:spcPts val="0"/>
+              </a:spcBef>
+              <a:spcAft>
+                <a:spcPts val="0"/>
+              </a:spcAft>
+              <a:buClrTx/>
+              <a:buSzTx/>
+              <a:buFontTx/>
+              <a:buNone/>
+              <a:tabLst/>
+            </a:pPr>
+            <a:r>
+              <a:rPr kumimoji="0" lang="de-DE" sz="3600" b="0" i="0" u="none" strike="noStrike" cap="none" spc="0" normalizeH="0" baseline="0" dirty="0" smtClean="0">
+                <a:ln>
+                  <a:noFill/>
+                </a:ln>
+                <a:solidFill>
+                  <a:srgbClr val="000000"/>
+                </a:solidFill>
+                <a:effectLst/>
+                <a:uFillTx/>
+                <a:latin typeface="+mn-lt"/>
+                <a:ea typeface="+mn-ea"/>
+                <a:cs typeface="+mn-cs"/>
+                <a:sym typeface="Helvetica Light"/>
+              </a:rPr>
+              <a:t>Linear</a:t>
+            </a:r>
+            <a:endParaRPr kumimoji="0" lang="de-DE" sz="3600" b="0" i="0" u="none" strike="noStrike" cap="none" spc="0" normalizeH="0" baseline="0" dirty="0">
+              <a:ln>
+                <a:noFill/>
+              </a:ln>
+              <a:solidFill>
+                <a:srgbClr val="000000"/>
+              </a:solidFill>
+              <a:effectLst/>
+              <a:uFillTx/>
+              <a:latin typeface="+mn-lt"/>
+              <a:ea typeface="+mn-ea"/>
+              <a:cs typeface="+mn-cs"/>
+              <a:sym typeface="Helvetica Light"/>
+            </a:endParaRPr>
+          </a:p>
+        </p:txBody>
+      </p:sp>
+      <p:sp>
+        <p:nvSpPr>
+          <p:cNvPr id="7" name="Textfeld 6"/>
+          <p:cNvSpPr txBox="1"/>
+          <p:nvPr/>
+        </p:nvSpPr>
+        <p:spPr>
+          <a:xfrm>
+            <a:off x="8635244" y="2638006"/>
+            <a:ext cx="2051845" cy="656590"/>
+          </a:xfrm>
+          <a:prstGeom prst="rect">
+            <a:avLst/>
+          </a:prstGeom>
+          <a:noFill/>
+          <a:ln w="12700" cap="flat">
+            <a:noFill/>
+            <a:miter lim="400000"/>
+          </a:ln>
+          <a:effectLst/>
+        </p:spPr>
+        <p:style>
+          <a:lnRef idx="0">
+            <a:scrgbClr r="0" g="0" b="0"/>
+          </a:lnRef>
+          <a:fillRef idx="0">
+            <a:scrgbClr r="0" g="0" b="0"/>
+          </a:fillRef>
+          <a:effectRef idx="0">
+            <a:scrgbClr r="0" g="0" b="0"/>
+          </a:effectRef>
+          <a:fontRef idx="none"/>
+        </p:style>
+        <p:txBody>
+          <a:bodyPr rot="0" spcFirstLastPara="1" vertOverflow="overflow" horzOverflow="overflow" vert="horz" wrap="none" lIns="50800" tIns="50800" rIns="50800" bIns="50800" numCol="1" spcCol="38100" rtlCol="0" anchor="ctr">
+            <a:spAutoFit/>
+          </a:bodyPr>
+          <a:lstStyle/>
+          <a:p>
+            <a:pPr marL="0" marR="0" indent="0" algn="ctr" defTabSz="584200" rtl="0" fontAlgn="auto" latinLnBrk="1" hangingPunct="0">
+              <a:lnSpc>
+                <a:spcPct val="100000"/>
+              </a:lnSpc>
+              <a:spcBef>
+                <a:spcPts val="0"/>
+              </a:spcBef>
+              <a:spcAft>
+                <a:spcPts val="0"/>
+              </a:spcAft>
+              <a:buClrTx/>
+              <a:buSzTx/>
+              <a:buFontTx/>
+              <a:buNone/>
+              <a:tabLst/>
+            </a:pPr>
+            <a:r>
+              <a:rPr kumimoji="0" lang="de-DE" sz="3600" b="0" i="0" u="none" strike="noStrike" cap="none" spc="0" normalizeH="0" baseline="0" dirty="0" err="1" smtClean="0">
+                <a:ln>
+                  <a:noFill/>
+                </a:ln>
+                <a:solidFill>
+                  <a:srgbClr val="000000"/>
+                </a:solidFill>
+                <a:effectLst/>
+                <a:uFillTx/>
+                <a:latin typeface="+mn-lt"/>
+                <a:ea typeface="+mn-ea"/>
+                <a:cs typeface="+mn-cs"/>
+                <a:sym typeface="Helvetica Light"/>
+              </a:rPr>
+              <a:t>Gaussian</a:t>
+            </a:r>
+            <a:endParaRPr kumimoji="0" lang="de-DE" sz="3600" b="0" i="0" u="none" strike="noStrike" cap="none" spc="0" normalizeH="0" baseline="0" dirty="0">
+              <a:ln>
+                <a:noFill/>
+              </a:ln>
+              <a:solidFill>
+                <a:srgbClr val="000000"/>
+              </a:solidFill>
+              <a:effectLst/>
+              <a:uFillTx/>
+              <a:latin typeface="+mn-lt"/>
+              <a:ea typeface="+mn-ea"/>
+              <a:cs typeface="+mn-cs"/>
+              <a:sym typeface="Helvetica Light"/>
+            </a:endParaRPr>
+          </a:p>
+        </p:txBody>
+      </p:sp>
     </p:spTree>
   </p:cSld>
   <p:clrMapOvr>
@@ -2145,7 +2707,9 @@
           </a:prstGeom>
         </p:spPr>
         <p:txBody>
-          <a:bodyPr/>
+          <a:bodyPr>
+            <a:normAutofit/>
+          </a:bodyPr>
           <a:lstStyle>
             <a:lvl1pPr defTabSz="525779">
               <a:defRPr sz="7200"/>
@@ -2156,7 +2720,7 @@
               <a:defRPr sz="1800"/>
             </a:pPr>
             <a:r>
-              <a:rPr sz="7200"/>
+              <a:rPr sz="6000" dirty="0"/>
               <a:t>Number of support vectors</a:t>
             </a:r>
           </a:p>
@@ -2164,13 +2728,19 @@
       </p:sp>
       <p:pic>
         <p:nvPicPr>
-          <p:cNvPr id="82" name="change_Support_Vectors_2016-06-24 20:51:56_n=1000_replication=100_C=1_kernel=linear_data= dataSimulation([0.8, 0.7, 0.9, -0.3], error, 0, n).png"/>
-          <p:cNvPicPr/>
+          <p:cNvPr id="2" name="Bild 1"/>
+          <p:cNvPicPr>
+            <a:picLocks noChangeAspect="1"/>
+          </p:cNvPicPr>
           <p:nvPr/>
         </p:nvPicPr>
         <p:blipFill>
           <a:blip r:embed="rId2">
-            <a:extLst/>
+            <a:extLst>
+              <a:ext uri="{28A0092B-C50C-407E-A947-70E740481C1C}">
+                <a14:useLocalDpi xmlns:a14="http://schemas.microsoft.com/office/drawing/2010/main" val="0"/>
+              </a:ext>
+            </a:extLst>
           </a:blip>
           <a:stretch>
             <a:fillRect/>
@@ -2178,17 +2748,456 @@
         </p:blipFill>
         <p:spPr>
           <a:xfrm>
-            <a:off x="1422400" y="1943100"/>
-            <a:ext cx="10160000" cy="7620000"/>
+            <a:off x="952500" y="3755366"/>
+            <a:ext cx="5290868" cy="3968151"/>
           </a:xfrm>
           <a:prstGeom prst="rect">
             <a:avLst/>
           </a:prstGeom>
-          <a:ln w="12700">
+        </p:spPr>
+      </p:pic>
+      <p:pic>
+        <p:nvPicPr>
+          <p:cNvPr id="4" name="Bild 3"/>
+          <p:cNvPicPr>
+            <a:picLocks noChangeAspect="1"/>
+          </p:cNvPicPr>
+          <p:nvPr/>
+        </p:nvPicPr>
+        <p:blipFill>
+          <a:blip r:embed="rId3">
+            <a:extLst>
+              <a:ext uri="{28A0092B-C50C-407E-A947-70E740481C1C}">
+                <a14:useLocalDpi xmlns:a14="http://schemas.microsoft.com/office/drawing/2010/main" val="0"/>
+              </a:ext>
+            </a:extLst>
+          </a:blip>
+          <a:stretch>
+            <a:fillRect/>
+          </a:stretch>
+        </p:blipFill>
+        <p:spPr>
+          <a:xfrm>
+            <a:off x="6762031" y="3755366"/>
+            <a:ext cx="5290269" cy="3967702"/>
+          </a:xfrm>
+          <a:prstGeom prst="rect">
+            <a:avLst/>
+          </a:prstGeom>
+        </p:spPr>
+      </p:pic>
+      <p:sp>
+        <p:nvSpPr>
+          <p:cNvPr id="7" name="Textfeld 6"/>
+          <p:cNvSpPr txBox="1"/>
+          <p:nvPr/>
+        </p:nvSpPr>
+        <p:spPr>
+          <a:xfrm>
+            <a:off x="3035403" y="2603500"/>
+            <a:ext cx="1384995" cy="656590"/>
+          </a:xfrm>
+          <a:prstGeom prst="rect">
+            <a:avLst/>
+          </a:prstGeom>
+          <a:noFill/>
+          <a:ln w="12700" cap="flat">
+            <a:noFill/>
             <a:miter lim="400000"/>
           </a:ln>
+          <a:effectLst/>
         </p:spPr>
-      </p:pic>
+        <p:style>
+          <a:lnRef idx="0">
+            <a:scrgbClr r="0" g="0" b="0"/>
+          </a:lnRef>
+          <a:fillRef idx="0">
+            <a:scrgbClr r="0" g="0" b="0"/>
+          </a:fillRef>
+          <a:effectRef idx="0">
+            <a:scrgbClr r="0" g="0" b="0"/>
+          </a:effectRef>
+          <a:fontRef idx="none"/>
+        </p:style>
+        <p:txBody>
+          <a:bodyPr rot="0" spcFirstLastPara="1" vertOverflow="overflow" horzOverflow="overflow" vert="horz" wrap="none" lIns="50800" tIns="50800" rIns="50800" bIns="50800" numCol="1" spcCol="38100" rtlCol="0" anchor="ctr">
+            <a:spAutoFit/>
+          </a:bodyPr>
+          <a:lstStyle/>
+          <a:p>
+            <a:pPr marL="0" marR="0" indent="0" algn="ctr" defTabSz="584200" rtl="0" fontAlgn="auto" latinLnBrk="1" hangingPunct="0">
+              <a:lnSpc>
+                <a:spcPct val="100000"/>
+              </a:lnSpc>
+              <a:spcBef>
+                <a:spcPts val="0"/>
+              </a:spcBef>
+              <a:spcAft>
+                <a:spcPts val="0"/>
+              </a:spcAft>
+              <a:buClrTx/>
+              <a:buSzTx/>
+              <a:buFontTx/>
+              <a:buNone/>
+              <a:tabLst/>
+            </a:pPr>
+            <a:r>
+              <a:rPr kumimoji="0" lang="de-DE" sz="3600" b="0" i="0" u="none" strike="noStrike" cap="none" spc="0" normalizeH="0" baseline="0" dirty="0" smtClean="0">
+                <a:ln>
+                  <a:noFill/>
+                </a:ln>
+                <a:solidFill>
+                  <a:srgbClr val="000000"/>
+                </a:solidFill>
+                <a:effectLst/>
+                <a:uFillTx/>
+                <a:latin typeface="+mn-lt"/>
+                <a:ea typeface="+mn-ea"/>
+                <a:cs typeface="+mn-cs"/>
+                <a:sym typeface="Helvetica Light"/>
+              </a:rPr>
+              <a:t>Linear</a:t>
+            </a:r>
+            <a:endParaRPr kumimoji="0" lang="de-DE" sz="3600" b="0" i="0" u="none" strike="noStrike" cap="none" spc="0" normalizeH="0" baseline="0" dirty="0">
+              <a:ln>
+                <a:noFill/>
+              </a:ln>
+              <a:solidFill>
+                <a:srgbClr val="000000"/>
+              </a:solidFill>
+              <a:effectLst/>
+              <a:uFillTx/>
+              <a:latin typeface="+mn-lt"/>
+              <a:ea typeface="+mn-ea"/>
+              <a:cs typeface="+mn-cs"/>
+              <a:sym typeface="Helvetica Light"/>
+            </a:endParaRPr>
+          </a:p>
+        </p:txBody>
+      </p:sp>
+      <p:sp>
+        <p:nvSpPr>
+          <p:cNvPr id="8" name="Textfeld 7"/>
+          <p:cNvSpPr txBox="1"/>
+          <p:nvPr/>
+        </p:nvSpPr>
+        <p:spPr>
+          <a:xfrm>
+            <a:off x="8635244" y="2638006"/>
+            <a:ext cx="2051845" cy="656590"/>
+          </a:xfrm>
+          <a:prstGeom prst="rect">
+            <a:avLst/>
+          </a:prstGeom>
+          <a:noFill/>
+          <a:ln w="12700" cap="flat">
+            <a:noFill/>
+            <a:miter lim="400000"/>
+          </a:ln>
+          <a:effectLst/>
+        </p:spPr>
+        <p:style>
+          <a:lnRef idx="0">
+            <a:scrgbClr r="0" g="0" b="0"/>
+          </a:lnRef>
+          <a:fillRef idx="0">
+            <a:scrgbClr r="0" g="0" b="0"/>
+          </a:fillRef>
+          <a:effectRef idx="0">
+            <a:scrgbClr r="0" g="0" b="0"/>
+          </a:effectRef>
+          <a:fontRef idx="none"/>
+        </p:style>
+        <p:txBody>
+          <a:bodyPr rot="0" spcFirstLastPara="1" vertOverflow="overflow" horzOverflow="overflow" vert="horz" wrap="none" lIns="50800" tIns="50800" rIns="50800" bIns="50800" numCol="1" spcCol="38100" rtlCol="0" anchor="ctr">
+            <a:spAutoFit/>
+          </a:bodyPr>
+          <a:lstStyle/>
+          <a:p>
+            <a:pPr marL="0" marR="0" indent="0" algn="ctr" defTabSz="584200" rtl="0" fontAlgn="auto" latinLnBrk="1" hangingPunct="0">
+              <a:lnSpc>
+                <a:spcPct val="100000"/>
+              </a:lnSpc>
+              <a:spcBef>
+                <a:spcPts val="0"/>
+              </a:spcBef>
+              <a:spcAft>
+                <a:spcPts val="0"/>
+              </a:spcAft>
+              <a:buClrTx/>
+              <a:buSzTx/>
+              <a:buFontTx/>
+              <a:buNone/>
+              <a:tabLst/>
+            </a:pPr>
+            <a:r>
+              <a:rPr kumimoji="0" lang="de-DE" sz="3600" b="0" i="0" u="none" strike="noStrike" cap="none" spc="0" normalizeH="0" baseline="0" dirty="0" err="1" smtClean="0">
+                <a:ln>
+                  <a:noFill/>
+                </a:ln>
+                <a:solidFill>
+                  <a:srgbClr val="000000"/>
+                </a:solidFill>
+                <a:effectLst/>
+                <a:uFillTx/>
+                <a:latin typeface="+mn-lt"/>
+                <a:ea typeface="+mn-ea"/>
+                <a:cs typeface="+mn-cs"/>
+                <a:sym typeface="Helvetica Light"/>
+              </a:rPr>
+              <a:t>Gaussian</a:t>
+            </a:r>
+            <a:endParaRPr kumimoji="0" lang="de-DE" sz="3600" b="0" i="0" u="none" strike="noStrike" cap="none" spc="0" normalizeH="0" baseline="0" dirty="0">
+              <a:ln>
+                <a:noFill/>
+              </a:ln>
+              <a:solidFill>
+                <a:srgbClr val="000000"/>
+              </a:solidFill>
+              <a:effectLst/>
+              <a:uFillTx/>
+              <a:latin typeface="+mn-lt"/>
+              <a:ea typeface="+mn-ea"/>
+              <a:cs typeface="+mn-cs"/>
+              <a:sym typeface="Helvetica Light"/>
+            </a:endParaRPr>
+          </a:p>
+        </p:txBody>
+      </p:sp>
+      <p:sp>
+        <p:nvSpPr>
+          <p:cNvPr id="9" name="Rechteck 8"/>
+          <p:cNvSpPr/>
+          <p:nvPr/>
+        </p:nvSpPr>
+        <p:spPr>
+          <a:xfrm>
+            <a:off x="8017329" y="4980214"/>
+            <a:ext cx="473528" cy="2286000"/>
+          </a:xfrm>
+          <a:prstGeom prst="rect">
+            <a:avLst/>
+          </a:prstGeom>
+          <a:blipFill rotWithShape="1">
+            <a:blip r:embed="rId4">
+              <a:biLevel thresh="25000"/>
+            </a:blip>
+            <a:srcRect/>
+            <a:tile tx="0" ty="0" sx="100000" sy="100000" flip="none" algn="tl"/>
+          </a:blipFill>
+          <a:ln w="12700" cap="flat">
+            <a:noFill/>
+            <a:miter lim="400000"/>
+          </a:ln>
+          <a:effectLst/>
+        </p:spPr>
+        <p:style>
+          <a:lnRef idx="0">
+            <a:scrgbClr r="0" g="0" b="0"/>
+          </a:lnRef>
+          <a:fillRef idx="0">
+            <a:scrgbClr r="0" g="0" b="0"/>
+          </a:fillRef>
+          <a:effectRef idx="0">
+            <a:scrgbClr r="0" g="0" b="0"/>
+          </a:effectRef>
+          <a:fontRef idx="none"/>
+        </p:style>
+        <p:txBody>
+          <a:bodyPr rot="0" spcFirstLastPara="1" vertOverflow="overflow" horzOverflow="overflow" vert="horz" wrap="square" lIns="50800" tIns="50800" rIns="50800" bIns="50800" numCol="1" spcCol="38100" rtlCol="0" anchor="ctr">
+            <a:spAutoFit/>
+          </a:bodyPr>
+          <a:lstStyle/>
+          <a:p>
+            <a:pPr marL="0" marR="0" indent="0" algn="ctr" defTabSz="584200" rtl="0" fontAlgn="auto" latinLnBrk="1" hangingPunct="0">
+              <a:lnSpc>
+                <a:spcPct val="100000"/>
+              </a:lnSpc>
+              <a:spcBef>
+                <a:spcPts val="0"/>
+              </a:spcBef>
+              <a:spcAft>
+                <a:spcPts val="0"/>
+              </a:spcAft>
+              <a:buClrTx/>
+              <a:buSzTx/>
+              <a:buFontTx/>
+              <a:buNone/>
+              <a:tabLst/>
+            </a:pPr>
+            <a:endParaRPr kumimoji="0" lang="de-DE" sz="2400" b="0" i="0" u="none" strike="noStrike" cap="none" spc="0" normalizeH="0" baseline="0">
+              <a:ln>
+                <a:noFill/>
+              </a:ln>
+              <a:solidFill>
+                <a:srgbClr val="FFFFFF"/>
+              </a:solidFill>
+              <a:effectLst/>
+              <a:uFillTx/>
+              <a:latin typeface="+mn-lt"/>
+              <a:ea typeface="+mn-ea"/>
+              <a:cs typeface="+mn-cs"/>
+              <a:sym typeface="Helvetica Light"/>
+            </a:endParaRPr>
+          </a:p>
+        </p:txBody>
+      </p:sp>
+      <p:sp>
+        <p:nvSpPr>
+          <p:cNvPr id="10" name="Rechteck 9"/>
+          <p:cNvSpPr/>
+          <p:nvPr/>
+        </p:nvSpPr>
+        <p:spPr>
+          <a:xfrm>
+            <a:off x="4446876" y="4724841"/>
+            <a:ext cx="940669" cy="2286000"/>
+          </a:xfrm>
+          <a:prstGeom prst="rect">
+            <a:avLst/>
+          </a:prstGeom>
+          <a:blipFill rotWithShape="1">
+            <a:blip r:embed="rId4">
+              <a:biLevel thresh="25000"/>
+            </a:blip>
+            <a:srcRect/>
+            <a:tile tx="0" ty="0" sx="100000" sy="100000" flip="none" algn="tl"/>
+          </a:blipFill>
+          <a:ln w="12700" cap="flat">
+            <a:noFill/>
+            <a:miter lim="400000"/>
+          </a:ln>
+          <a:effectLst/>
+        </p:spPr>
+        <p:style>
+          <a:lnRef idx="0">
+            <a:scrgbClr r="0" g="0" b="0"/>
+          </a:lnRef>
+          <a:fillRef idx="0">
+            <a:scrgbClr r="0" g="0" b="0"/>
+          </a:fillRef>
+          <a:effectRef idx="0">
+            <a:scrgbClr r="0" g="0" b="0"/>
+          </a:effectRef>
+          <a:fontRef idx="none"/>
+        </p:style>
+        <p:txBody>
+          <a:bodyPr rot="0" spcFirstLastPara="1" vertOverflow="overflow" horzOverflow="overflow" vert="horz" wrap="square" lIns="50800" tIns="50800" rIns="50800" bIns="50800" numCol="1" spcCol="38100" rtlCol="0" anchor="ctr">
+            <a:spAutoFit/>
+          </a:bodyPr>
+          <a:lstStyle/>
+          <a:p>
+            <a:pPr marL="0" marR="0" indent="0" algn="ctr" defTabSz="584200" rtl="0" fontAlgn="auto" latinLnBrk="1" hangingPunct="0">
+              <a:lnSpc>
+                <a:spcPct val="100000"/>
+              </a:lnSpc>
+              <a:spcBef>
+                <a:spcPts val="0"/>
+              </a:spcBef>
+              <a:spcAft>
+                <a:spcPts val="0"/>
+              </a:spcAft>
+              <a:buClrTx/>
+              <a:buSzTx/>
+              <a:buFontTx/>
+              <a:buNone/>
+              <a:tabLst/>
+            </a:pPr>
+            <a:endParaRPr kumimoji="0" lang="de-DE" sz="2400" b="0" i="0" u="none" strike="noStrike" cap="none" spc="0" normalizeH="0" baseline="0">
+              <a:ln>
+                <a:noFill/>
+              </a:ln>
+              <a:solidFill>
+                <a:srgbClr val="FFFFFF"/>
+              </a:solidFill>
+              <a:effectLst/>
+              <a:uFillTx/>
+              <a:latin typeface="+mn-lt"/>
+              <a:ea typeface="+mn-ea"/>
+              <a:cs typeface="+mn-cs"/>
+              <a:sym typeface="Helvetica Light"/>
+            </a:endParaRPr>
+          </a:p>
+        </p:txBody>
+      </p:sp>
+      <p:sp>
+        <p:nvSpPr>
+          <p:cNvPr id="11" name="Rechteck 10"/>
+          <p:cNvSpPr/>
+          <p:nvPr/>
+        </p:nvSpPr>
+        <p:spPr>
+          <a:xfrm>
+            <a:off x="10345168" y="4446462"/>
+            <a:ext cx="940669" cy="2286000"/>
+          </a:xfrm>
+          <a:prstGeom prst="rect">
+            <a:avLst/>
+          </a:prstGeom>
+          <a:blipFill rotWithShape="1">
+            <a:blip r:embed="rId4">
+              <a:biLevel thresh="25000"/>
+            </a:blip>
+            <a:srcRect/>
+            <a:tile tx="0" ty="0" sx="100000" sy="100000" flip="none" algn="tl"/>
+          </a:blipFill>
+          <a:ln w="12700" cap="flat">
+            <a:noFill/>
+            <a:miter lim="400000"/>
+          </a:ln>
+          <a:effectLst/>
+        </p:spPr>
+        <p:style>
+          <a:lnRef idx="0">
+            <a:scrgbClr r="0" g="0" b="0"/>
+          </a:lnRef>
+          <a:fillRef idx="0">
+            <a:scrgbClr r="0" g="0" b="0"/>
+          </a:fillRef>
+          <a:effectRef idx="0">
+            <a:scrgbClr r="0" g="0" b="0"/>
+          </a:effectRef>
+          <a:fontRef idx="none"/>
+        </p:style>
+        <p:txBody>
+          <a:bodyPr rot="0" spcFirstLastPara="1" vertOverflow="overflow" horzOverflow="overflow" vert="horz" wrap="square" lIns="50800" tIns="50800" rIns="50800" bIns="50800" numCol="1" spcCol="38100" rtlCol="0" anchor="ctr">
+            <a:spAutoFit/>
+          </a:bodyPr>
+          <a:lstStyle/>
+          <a:p>
+            <a:pPr marL="0" marR="0" indent="0" algn="ctr" defTabSz="584200" rtl="0" fontAlgn="auto" latinLnBrk="1" hangingPunct="0">
+              <a:lnSpc>
+                <a:spcPct val="100000"/>
+              </a:lnSpc>
+              <a:spcBef>
+                <a:spcPts val="0"/>
+              </a:spcBef>
+              <a:spcAft>
+                <a:spcPts val="0"/>
+              </a:spcAft>
+              <a:buClrTx/>
+              <a:buSzTx/>
+              <a:buFontTx/>
+              <a:buNone/>
+              <a:tabLst/>
+            </a:pPr>
+            <a:endParaRPr kumimoji="0" lang="de-DE" sz="2400" b="0" i="0" u="none" strike="noStrike" cap="none" spc="0" normalizeH="0" baseline="0">
+              <a:ln>
+                <a:noFill/>
+              </a:ln>
+              <a:solidFill>
+                <a:srgbClr val="FFFFFF"/>
+              </a:solidFill>
+              <a:effectLst/>
+              <a:uFillTx/>
+              <a:latin typeface="+mn-lt"/>
+              <a:ea typeface="+mn-ea"/>
+              <a:cs typeface="+mn-cs"/>
+              <a:sym typeface="Helvetica Light"/>
+            </a:endParaRPr>
+          </a:p>
+        </p:txBody>
+      </p:sp>
     </p:spTree>
   </p:cSld>
   <p:clrMapOvr>
@@ -2231,14 +3240,16 @@
           </a:prstGeom>
         </p:spPr>
         <p:txBody>
-          <a:bodyPr/>
+          <a:bodyPr>
+            <a:normAutofit/>
+          </a:bodyPr>
           <a:lstStyle/>
           <a:p>
             <a:pPr lvl="0">
               <a:defRPr sz="1800"/>
             </a:pPr>
             <a:r>
-              <a:rPr sz="8000"/>
+              <a:rPr sz="6000" dirty="0"/>
               <a:t>Conclusion</a:t>
             </a:r>
           </a:p>
@@ -2271,27 +3282,86 @@
               <a:defRPr sz="1800"/>
             </a:pPr>
             <a:r>
-              <a:rPr sz="3600"/>
-              <a:t>the C parameter</a:t>
-            </a:r>
+              <a:rPr lang="de-DE" sz="3600" b="1" dirty="0" smtClean="0"/>
+              <a:t>C-Parameter</a:t>
+            </a:r>
+            <a:r>
+              <a:rPr lang="de-DE" sz="3600" dirty="0" smtClean="0"/>
+              <a:t>: </a:t>
+            </a:r>
+            <a:r>
+              <a:rPr lang="de-DE" sz="3600" dirty="0" err="1" smtClean="0"/>
+              <a:t>both</a:t>
+            </a:r>
+            <a:r>
+              <a:rPr lang="de-DE" sz="3600" dirty="0" smtClean="0"/>
+              <a:t> same</a:t>
+            </a:r>
+            <a:endParaRPr sz="3600" dirty="0" smtClean="0"/>
           </a:p>
           <a:p>
             <a:pPr lvl="0">
               <a:defRPr sz="1800"/>
             </a:pPr>
             <a:r>
-              <a:rPr sz="3600"/>
-              <a:t>the balance of the data</a:t>
-            </a:r>
+              <a:rPr lang="de-DE" sz="3600" b="1" dirty="0" smtClean="0"/>
+              <a:t>Balance </a:t>
+            </a:r>
+            <a:r>
+              <a:rPr lang="de-DE" sz="3600" b="1" dirty="0" err="1" smtClean="0"/>
+              <a:t>of</a:t>
+            </a:r>
+            <a:r>
+              <a:rPr lang="de-DE" sz="3600" b="1" dirty="0" smtClean="0"/>
+              <a:t> Data</a:t>
+            </a:r>
+            <a:r>
+              <a:rPr lang="de-DE" sz="3600" dirty="0" smtClean="0"/>
+              <a:t>: </a:t>
+            </a:r>
+            <a:r>
+              <a:rPr lang="de-DE" sz="3600" dirty="0" err="1" smtClean="0"/>
+              <a:t>differnt</a:t>
+            </a:r>
+            <a:endParaRPr lang="de-DE" sz="3600" dirty="0" smtClean="0"/>
           </a:p>
           <a:p>
             <a:pPr lvl="0">
               <a:defRPr sz="1800"/>
             </a:pPr>
             <a:r>
-              <a:rPr sz="3600"/>
-              <a:t>the number of support vectors</a:t>
-            </a:r>
+              <a:rPr lang="de-DE" sz="3600" b="1" dirty="0" smtClean="0"/>
+              <a:t>The </a:t>
+            </a:r>
+            <a:r>
+              <a:rPr lang="de-DE" sz="3600" b="1" dirty="0" err="1" smtClean="0"/>
+              <a:t>attribute</a:t>
+            </a:r>
+            <a:r>
+              <a:rPr lang="de-DE" sz="3600" b="1" dirty="0" smtClean="0"/>
+              <a:t> </a:t>
+            </a:r>
+            <a:r>
+              <a:rPr sz="3600" b="1" dirty="0" smtClean="0"/>
+              <a:t>number </a:t>
+            </a:r>
+            <a:r>
+              <a:rPr sz="3600" b="1" dirty="0"/>
+              <a:t>of support </a:t>
+            </a:r>
+            <a:r>
+              <a:rPr sz="3600" b="1" dirty="0" smtClean="0"/>
+              <a:t>vector</a:t>
+            </a:r>
+            <a:r>
+              <a:rPr lang="de-DE" sz="3600" b="1" dirty="0" smtClean="0"/>
+              <a:t>s: </a:t>
+            </a:r>
+            <a:r>
+              <a:rPr lang="de-DE" sz="3600" dirty="0" smtClean="0"/>
+              <a:t>different</a:t>
+            </a:r>
+            <a:endParaRPr sz="3600" dirty="0"/>
           </a:p>
         </p:txBody>
       </p:sp>
@@ -2303,8 +3373,8 @@
         </p:nvSpPr>
         <p:spPr>
           <a:xfrm>
-            <a:off x="825118" y="2914650"/>
-            <a:ext cx="11354563" cy="647701"/>
+            <a:off x="2180722" y="2910206"/>
+            <a:ext cx="8643392" cy="656590"/>
           </a:xfrm>
           <a:prstGeom prst="rect">
             <a:avLst/>
@@ -2328,9 +3398,34 @@
               <a:defRPr sz="1800"/>
             </a:pPr>
             <a:r>
-              <a:rPr sz="3600"/>
-              <a:t>The variance of a support vector machine depends on </a:t>
-            </a:r>
+              <a:rPr lang="de-DE" sz="3600" dirty="0" err="1" smtClean="0"/>
+              <a:t>Influence</a:t>
+            </a:r>
+            <a:r>
+              <a:rPr lang="de-DE" sz="3600" dirty="0" smtClean="0"/>
+              <a:t> </a:t>
+            </a:r>
+            <a:r>
+              <a:rPr lang="de-DE" sz="3600" dirty="0" err="1" smtClean="0"/>
+              <a:t>of</a:t>
+            </a:r>
+            <a:r>
+              <a:rPr lang="de-DE" sz="3600" dirty="0" smtClean="0"/>
+              <a:t> different </a:t>
+            </a:r>
+            <a:r>
+              <a:rPr lang="de-DE" sz="3600" dirty="0" err="1" smtClean="0"/>
+              <a:t>aspects</a:t>
+            </a:r>
+            <a:r>
+              <a:rPr lang="de-DE" sz="3600" dirty="0" smtClean="0"/>
+              <a:t> on </a:t>
+            </a:r>
+            <a:r>
+              <a:rPr lang="de-DE" sz="3600" dirty="0" err="1" smtClean="0"/>
+              <a:t>variance</a:t>
+            </a:r>
+            <a:endParaRPr sz="3600" dirty="0"/>
           </a:p>
         </p:txBody>
       </p:sp>
@@ -2488,14 +3583,16 @@
           </a:prstGeom>
         </p:spPr>
         <p:txBody>
-          <a:bodyPr/>
+          <a:bodyPr>
+            <a:normAutofit/>
+          </a:bodyPr>
           <a:lstStyle/>
           <a:p>
             <a:pPr lvl="0">
               <a:defRPr sz="1800"/>
             </a:pPr>
             <a:r>
-              <a:rPr sz="8000" dirty="0"/>
+              <a:rPr sz="6000" dirty="0"/>
               <a:t>Support Vector Machine</a:t>
             </a:r>
           </a:p>
@@ -2512,51 +3609,222 @@
           </p:nvPr>
         </p:nvSpPr>
         <p:spPr>
+          <a:xfrm>
+            <a:off x="952500" y="3609244"/>
+            <a:ext cx="5155002" cy="5160274"/>
+          </a:xfrm>
           <a:prstGeom prst="rect">
             <a:avLst/>
           </a:prstGeom>
         </p:spPr>
         <p:txBody>
-          <a:bodyPr/>
+          <a:bodyPr>
+            <a:normAutofit fontScale="92500" lnSpcReduction="10000"/>
+          </a:bodyPr>
           <a:lstStyle/>
           <a:p>
             <a:pPr lvl="0">
               <a:defRPr sz="1800"/>
             </a:pPr>
             <a:r>
-              <a:rPr sz="3600" dirty="0"/>
-              <a:t>repetition</a:t>
-            </a:r>
+              <a:rPr lang="de-DE" sz="3600" dirty="0" err="1" smtClean="0"/>
+              <a:t>Uses</a:t>
+            </a:r>
+            <a:r>
+              <a:rPr lang="de-DE" sz="3600" dirty="0" smtClean="0"/>
+              <a:t> hyperplane in </a:t>
+            </a:r>
+            <a:r>
+              <a:rPr lang="de-DE" sz="3600" dirty="0" err="1" smtClean="0"/>
+              <a:t>feature</a:t>
+            </a:r>
+            <a:r>
+              <a:rPr lang="de-DE" sz="3600" dirty="0" smtClean="0"/>
+              <a:t> </a:t>
+            </a:r>
+            <a:r>
+              <a:rPr lang="de-DE" sz="3600" dirty="0" err="1" smtClean="0"/>
+              <a:t>space</a:t>
+            </a:r>
+            <a:r>
+              <a:rPr lang="de-DE" sz="3600" dirty="0" smtClean="0"/>
+              <a:t> </a:t>
+            </a:r>
+            <a:r>
+              <a:rPr lang="de-DE" sz="3600" dirty="0" err="1" smtClean="0"/>
+              <a:t>to</a:t>
+            </a:r>
+            <a:r>
+              <a:rPr lang="de-DE" sz="3600" dirty="0" smtClean="0"/>
+              <a:t> </a:t>
+            </a:r>
+            <a:r>
+              <a:rPr lang="de-DE" sz="3600" dirty="0" err="1" smtClean="0"/>
+              <a:t>seperate</a:t>
+            </a:r>
+            <a:r>
+              <a:rPr lang="de-DE" sz="3600" dirty="0" smtClean="0"/>
+              <a:t> </a:t>
+            </a:r>
+            <a:r>
+              <a:rPr lang="de-DE" sz="3600" dirty="0" err="1" smtClean="0"/>
+              <a:t>data</a:t>
+            </a:r>
+            <a:endParaRPr lang="de-DE" sz="3600" dirty="0" smtClean="0"/>
           </a:p>
           <a:p>
             <a:pPr lvl="0">
               <a:defRPr sz="1800"/>
             </a:pPr>
             <a:r>
-              <a:rPr sz="3600" dirty="0"/>
-              <a:t>no distribution</a:t>
-            </a:r>
+              <a:rPr lang="de-DE" sz="3600" dirty="0" smtClean="0"/>
+              <a:t>Dimension </a:t>
+            </a:r>
+            <a:r>
+              <a:rPr lang="de-DE" sz="3600" dirty="0" err="1" smtClean="0"/>
+              <a:t>of</a:t>
+            </a:r>
+            <a:r>
+              <a:rPr lang="de-DE" sz="3600" dirty="0" smtClean="0"/>
+              <a:t> </a:t>
+            </a:r>
+            <a:r>
+              <a:rPr lang="de-DE" sz="3600" dirty="0" err="1" smtClean="0"/>
+              <a:t>feature</a:t>
+            </a:r>
+            <a:r>
+              <a:rPr lang="de-DE" sz="3600" dirty="0" smtClean="0"/>
+              <a:t> </a:t>
+            </a:r>
+            <a:r>
+              <a:rPr lang="de-DE" sz="3600" dirty="0" err="1" smtClean="0"/>
+              <a:t>space</a:t>
+            </a:r>
+            <a:r>
+              <a:rPr lang="de-DE" sz="3600" dirty="0" smtClean="0"/>
+              <a:t> </a:t>
+            </a:r>
+            <a:r>
+              <a:rPr lang="de-DE" sz="3600" dirty="0" err="1" smtClean="0"/>
+              <a:t>controlled</a:t>
+            </a:r>
+            <a:r>
+              <a:rPr lang="de-DE" sz="3600" dirty="0" smtClean="0"/>
+              <a:t> </a:t>
+            </a:r>
+            <a:r>
+              <a:rPr lang="de-DE" sz="3600" dirty="0" err="1" smtClean="0"/>
+              <a:t>by</a:t>
+            </a:r>
+            <a:r>
+              <a:rPr lang="de-DE" sz="3600" dirty="0" smtClean="0"/>
+              <a:t> </a:t>
+            </a:r>
+            <a:r>
+              <a:rPr lang="de-DE" sz="3600" dirty="0" err="1" smtClean="0"/>
+              <a:t>choice</a:t>
+            </a:r>
+            <a:r>
+              <a:rPr lang="de-DE" sz="3600" dirty="0" smtClean="0"/>
+              <a:t> </a:t>
+            </a:r>
+            <a:r>
+              <a:rPr lang="de-DE" sz="3600" dirty="0" err="1" smtClean="0"/>
+              <a:t>of</a:t>
+            </a:r>
+            <a:r>
+              <a:rPr lang="de-DE" sz="3600" dirty="0" smtClean="0"/>
+              <a:t> </a:t>
+            </a:r>
+            <a:r>
+              <a:rPr lang="de-DE" sz="3600" dirty="0" err="1" smtClean="0"/>
+              <a:t>kernel</a:t>
+            </a:r>
+            <a:r>
+              <a:rPr lang="de-DE" sz="3600" dirty="0" smtClean="0"/>
+              <a:t> </a:t>
+            </a:r>
+            <a:r>
+              <a:rPr lang="de-DE" sz="3600" dirty="0" err="1" smtClean="0"/>
+              <a:t>function</a:t>
+            </a:r>
+            <a:endParaRPr lang="de-DE" sz="3600" dirty="0" smtClean="0"/>
           </a:p>
           <a:p>
             <a:pPr lvl="0">
               <a:defRPr sz="1800"/>
             </a:pPr>
             <a:r>
-              <a:rPr sz="3600" dirty="0"/>
-              <a:t>no variance</a:t>
+              <a:rPr lang="de-DE" sz="3600" dirty="0" err="1" smtClean="0"/>
+              <a:t>Commen</a:t>
+            </a:r>
+            <a:r>
+              <a:rPr lang="de-DE" sz="3600" dirty="0" smtClean="0"/>
+              <a:t> Kernels: linear, </a:t>
+            </a:r>
+            <a:r>
+              <a:rPr lang="de-DE" sz="3600" dirty="0" err="1" smtClean="0"/>
+              <a:t>polynomial</a:t>
+            </a:r>
+            <a:r>
+              <a:rPr lang="de-DE" sz="3600" dirty="0" smtClean="0"/>
+              <a:t>, </a:t>
+            </a:r>
+            <a:r>
+              <a:rPr lang="de-DE" sz="3600" dirty="0" err="1" smtClean="0"/>
+              <a:t>gaussian</a:t>
+            </a:r>
+            <a:r>
+              <a:rPr lang="de-DE" sz="3600" dirty="0" smtClean="0"/>
+              <a:t>(</a:t>
+            </a:r>
+            <a:r>
+              <a:rPr lang="de-DE" sz="3600" dirty="0" err="1" smtClean="0"/>
+              <a:t>rbf</a:t>
+            </a:r>
+            <a:r>
+              <a:rPr lang="de-DE" sz="3600" dirty="0" smtClean="0"/>
+              <a:t>)</a:t>
             </a:r>
           </a:p>
           <a:p>
             <a:pPr lvl="0">
               <a:defRPr sz="1800"/>
             </a:pPr>
-            <a:r>
-              <a:rPr sz="3600" dirty="0"/>
-              <a:t>no confidence intervals</a:t>
-            </a:r>
+            <a:endParaRPr sz="3600" dirty="0"/>
           </a:p>
         </p:txBody>
       </p:sp>
+      <p:pic>
+        <p:nvPicPr>
+          <p:cNvPr id="5" name="Bild 4"/>
+          <p:cNvPicPr>
+            <a:picLocks noChangeAspect="1"/>
+          </p:cNvPicPr>
+          <p:nvPr/>
+        </p:nvPicPr>
+        <p:blipFill>
+          <a:blip r:embed="rId2">
+            <a:extLst>
+              <a:ext uri="{28A0092B-C50C-407E-A947-70E740481C1C}">
+                <a14:useLocalDpi xmlns:a14="http://schemas.microsoft.com/office/drawing/2010/main" val="0"/>
+              </a:ext>
+            </a:extLst>
+          </a:blip>
+          <a:stretch>
+            <a:fillRect/>
+          </a:stretch>
+        </p:blipFill>
+        <p:spPr>
+          <a:xfrm>
+            <a:off x="6296774" y="3593669"/>
+            <a:ext cx="5883724" cy="4412793"/>
+          </a:xfrm>
+          <a:prstGeom prst="rect">
+            <a:avLst/>
+          </a:prstGeom>
+        </p:spPr>
+      </p:pic>
     </p:spTree>
   </p:cSld>
   <p:clrMapOvr>
@@ -2599,16 +3867,31 @@
           </a:prstGeom>
         </p:spPr>
         <p:txBody>
-          <a:bodyPr/>
+          <a:bodyPr>
+            <a:normAutofit/>
+          </a:bodyPr>
           <a:lstStyle/>
           <a:p>
             <a:pPr lvl="0">
               <a:defRPr sz="1800"/>
             </a:pPr>
             <a:r>
-              <a:rPr sz="8000"/>
-              <a:t>Problem</a:t>
-            </a:r>
+              <a:rPr lang="de-DE" sz="6000" dirty="0" err="1" smtClean="0"/>
+              <a:t>Why</a:t>
+            </a:r>
+            <a:r>
+              <a:rPr lang="de-DE" sz="6000" dirty="0" smtClean="0"/>
+              <a:t> </a:t>
+            </a:r>
+            <a:r>
+              <a:rPr lang="de-DE" sz="6000" dirty="0" err="1" smtClean="0"/>
+              <a:t>use</a:t>
+            </a:r>
+            <a:r>
+              <a:rPr lang="de-DE" sz="6000" dirty="0" smtClean="0"/>
+              <a:t> Bootstrapping ?</a:t>
+            </a:r>
+            <a:endParaRPr sz="6000" dirty="0"/>
           </a:p>
         </p:txBody>
       </p:sp>
@@ -2672,16 +3955,111 @@
         </p:nvSpPr>
         <p:spPr>
           <a:xfrm>
-            <a:off x="952500" y="2603500"/>
-            <a:ext cx="11099800" cy="2159000"/>
+            <a:off x="7504434" y="2871393"/>
+            <a:ext cx="4210238" cy="6502644"/>
           </a:xfrm>
           <a:prstGeom prst="rect">
             <a:avLst/>
           </a:prstGeom>
         </p:spPr>
         <p:txBody>
-          <a:bodyPr/>
+          <a:bodyPr>
+            <a:normAutofit/>
+          </a:bodyPr>
           <a:lstStyle/>
+          <a:p>
+            <a:pPr marL="342264" indent="-342264" defTabSz="449833">
+              <a:spcBef>
+                <a:spcPts val="3200"/>
+              </a:spcBef>
+              <a:defRPr sz="1800"/>
+            </a:pPr>
+            <a:r>
+              <a:rPr lang="de-DE" sz="2772" b="1" dirty="0"/>
+              <a:t>Goal: </a:t>
+            </a:r>
+            <a:r>
+              <a:rPr lang="de-DE" sz="2772" dirty="0"/>
+              <a:t>Find </a:t>
+            </a:r>
+            <a:r>
+              <a:rPr lang="de-DE" sz="2772" dirty="0" err="1"/>
+              <a:t>influence</a:t>
+            </a:r>
+            <a:r>
+              <a:rPr lang="de-DE" sz="2772" dirty="0"/>
+              <a:t> </a:t>
+            </a:r>
+            <a:r>
+              <a:rPr lang="de-DE" sz="2772" dirty="0" err="1"/>
+              <a:t>of</a:t>
+            </a:r>
+            <a:r>
+              <a:rPr lang="de-DE" sz="2772" dirty="0"/>
+              <a:t> </a:t>
+            </a:r>
+            <a:r>
+              <a:rPr lang="de-DE" sz="2772" dirty="0" err="1"/>
+              <a:t>tuning</a:t>
+            </a:r>
+            <a:r>
+              <a:rPr lang="de-DE" sz="2772" dirty="0"/>
+              <a:t> </a:t>
+            </a:r>
+            <a:r>
+              <a:rPr lang="de-DE" sz="2772" dirty="0" err="1"/>
+              <a:t>parameters</a:t>
+            </a:r>
+            <a:r>
+              <a:rPr lang="de-DE" sz="2772" dirty="0"/>
+              <a:t>, </a:t>
+            </a:r>
+            <a:r>
+              <a:rPr lang="de-DE" sz="2772" dirty="0" err="1"/>
+              <a:t>data</a:t>
+            </a:r>
+            <a:r>
+              <a:rPr lang="de-DE" sz="2772" dirty="0"/>
+              <a:t>-distribution </a:t>
+            </a:r>
+            <a:r>
+              <a:rPr lang="de-DE" sz="2772" dirty="0" err="1"/>
+              <a:t>and</a:t>
+            </a:r>
+            <a:r>
+              <a:rPr lang="de-DE" sz="2772" dirty="0"/>
+              <a:t> </a:t>
+            </a:r>
+            <a:r>
+              <a:rPr lang="de-DE" sz="2772" dirty="0" err="1"/>
+              <a:t>svm</a:t>
+            </a:r>
+            <a:r>
+              <a:rPr lang="de-DE" sz="2772" dirty="0"/>
+              <a:t>-attributes on </a:t>
+            </a:r>
+            <a:r>
+              <a:rPr lang="de-DE" sz="2772" dirty="0" err="1"/>
+              <a:t>variances</a:t>
+            </a:r>
+            <a:r>
+              <a:rPr lang="de-DE" sz="2772" dirty="0"/>
+              <a:t> </a:t>
+            </a:r>
+            <a:r>
+              <a:rPr lang="de-DE" sz="2772" dirty="0" err="1"/>
+              <a:t>of</a:t>
+            </a:r>
+            <a:r>
+              <a:rPr lang="de-DE" sz="2772" dirty="0"/>
+              <a:t> </a:t>
+            </a:r>
+            <a:r>
+              <a:rPr lang="de-DE" sz="2772" dirty="0" err="1" smtClean="0"/>
+              <a:t>predictions</a:t>
+            </a:r>
+            <a:endParaRPr lang="de-DE" sz="2772" dirty="0" smtClean="0"/>
+          </a:p>
           <a:p>
             <a:pPr marL="342264" lvl="0" indent="-342264" defTabSz="449833">
               <a:spcBef>
@@ -2690,9 +4068,70 @@
               <a:defRPr sz="1800"/>
             </a:pPr>
             <a:r>
-              <a:rPr sz="2772"/>
-              <a:t>no distribution</a:t>
-            </a:r>
+              <a:rPr lang="de-DE" sz="2772" b="1" dirty="0" smtClean="0"/>
+              <a:t>Problem: </a:t>
+            </a:r>
+            <a:r>
+              <a:rPr lang="de-DE" sz="2772" dirty="0"/>
+              <a:t>N</a:t>
+            </a:r>
+            <a:r>
+              <a:rPr sz="2772" dirty="0" smtClean="0"/>
+              <a:t>o </a:t>
+            </a:r>
+            <a:r>
+              <a:rPr lang="de-DE" sz="2772" dirty="0" err="1" smtClean="0"/>
+              <a:t>way</a:t>
+            </a:r>
+            <a:r>
+              <a:rPr lang="de-DE" sz="2772" dirty="0" smtClean="0"/>
+              <a:t> </a:t>
+            </a:r>
+            <a:r>
+              <a:rPr lang="de-DE" sz="2772" dirty="0" err="1" smtClean="0"/>
+              <a:t>to</a:t>
+            </a:r>
+            <a:r>
+              <a:rPr lang="de-DE" sz="2772" dirty="0" smtClean="0"/>
+              <a:t> </a:t>
+            </a:r>
+            <a:r>
+              <a:rPr lang="de-DE" sz="2772" dirty="0" err="1" smtClean="0"/>
+              <a:t>calculate</a:t>
+            </a:r>
+            <a:r>
+              <a:rPr lang="de-DE" sz="2772" dirty="0" smtClean="0"/>
+              <a:t> </a:t>
+            </a:r>
+            <a:r>
+              <a:rPr lang="de-DE" sz="2772" dirty="0" err="1" smtClean="0"/>
+              <a:t>uncertaincy</a:t>
+            </a:r>
+            <a:r>
+              <a:rPr lang="de-DE" sz="2772" dirty="0" smtClean="0"/>
+              <a:t> (</a:t>
+            </a:r>
+            <a:r>
+              <a:rPr lang="de-DE" sz="2772" dirty="0" err="1" smtClean="0"/>
+              <a:t>variance</a:t>
+            </a:r>
+            <a:r>
+              <a:rPr lang="de-DE" sz="2772" dirty="0" smtClean="0"/>
+              <a:t>) </a:t>
+            </a:r>
+            <a:r>
+              <a:rPr lang="de-DE" sz="2772" dirty="0" err="1" smtClean="0"/>
+              <a:t>of</a:t>
+            </a:r>
+            <a:r>
+              <a:rPr lang="de-DE" sz="2772" dirty="0" smtClean="0"/>
+              <a:t> </a:t>
+            </a:r>
+            <a:r>
+              <a:rPr lang="de-DE" sz="2772" dirty="0" err="1" smtClean="0"/>
+              <a:t>predicitons</a:t>
+            </a:r>
+            <a:endParaRPr sz="2772" dirty="0"/>
           </a:p>
           <a:p>
             <a:pPr marL="342264" lvl="0" indent="-342264" defTabSz="449833">
@@ -2702,8 +4141,40 @@
               <a:defRPr sz="1800"/>
             </a:pPr>
             <a:r>
-              <a:rPr sz="2772"/>
-              <a:t>no variance</a:t>
+              <a:rPr lang="de-DE" sz="2772" b="1" dirty="0" smtClean="0"/>
+              <a:t>Solution</a:t>
+            </a:r>
+            <a:r>
+              <a:rPr lang="de-DE" sz="2772" b="1" dirty="0" smtClean="0"/>
+              <a:t>: </a:t>
+            </a:r>
+            <a:r>
+              <a:rPr lang="de-DE" sz="2772" dirty="0" err="1"/>
+              <a:t>C</a:t>
+            </a:r>
+            <a:r>
+              <a:rPr lang="de-DE" sz="2772" dirty="0" err="1" smtClean="0"/>
+              <a:t>alculate</a:t>
+            </a:r>
+            <a:r>
+              <a:rPr lang="de-DE" sz="2772" dirty="0" smtClean="0"/>
+              <a:t> sample </a:t>
+            </a:r>
+            <a:r>
+              <a:rPr lang="de-DE" sz="2772" dirty="0" err="1" smtClean="0"/>
+              <a:t>variance</a:t>
+            </a:r>
+            <a:r>
+              <a:rPr lang="de-DE" sz="2772" dirty="0" smtClean="0"/>
+              <a:t> </a:t>
+            </a:r>
+            <a:r>
+              <a:rPr lang="de-DE" sz="2772" dirty="0" err="1" smtClean="0"/>
+              <a:t>based</a:t>
+            </a:r>
+            <a:r>
+              <a:rPr lang="de-DE" sz="2772" dirty="0" smtClean="0"/>
+              <a:t> on bootstrapping</a:t>
             </a:r>
           </a:p>
           <a:p>
@@ -2713,49 +4184,7 @@
               </a:spcBef>
               <a:defRPr sz="1800"/>
             </a:pPr>
-            <a:r>
-              <a:rPr sz="2772"/>
-              <a:t>no confidence intervals</a:t>
-            </a:r>
-          </a:p>
-        </p:txBody>
-      </p:sp>
-      <p:sp>
-        <p:nvSpPr>
-          <p:cNvPr id="41" name="Shape 41"/>
-          <p:cNvSpPr/>
-          <p:nvPr/>
-        </p:nvSpPr>
-        <p:spPr>
-          <a:xfrm>
-            <a:off x="972489" y="7283450"/>
-            <a:ext cx="5421022" cy="647701"/>
-          </a:xfrm>
-          <a:prstGeom prst="rect">
-            <a:avLst/>
-          </a:prstGeom>
-          <a:ln w="12700">
-            <a:miter lim="400000"/>
-          </a:ln>
-          <a:extLst>
-            <a:ext uri="{C572A759-6A51-4108-AA02-DFA0A04FC94B}">
-              <ma14:wrappingTextBoxFlag xmlns:ma14="http://schemas.microsoft.com/office/mac/drawingml/2011/main" val="1"/>
-            </a:ext>
-          </a:extLst>
-        </p:spPr>
-        <p:txBody>
-          <a:bodyPr wrap="none" lIns="50800" tIns="50800" rIns="50800" bIns="50800" anchor="ctr">
-            <a:spAutoFit/>
-          </a:bodyPr>
-          <a:lstStyle/>
-          <a:p>
-            <a:pPr lvl="0">
-              <a:defRPr sz="1800"/>
-            </a:pPr>
-            <a:r>
-              <a:rPr sz="3600"/>
-              <a:t>-&gt; Bootstrapping the SVM</a:t>
-            </a:r>
+            <a:endParaRPr sz="2772" dirty="0"/>
           </a:p>
         </p:txBody>
       </p:sp>
@@ -2781,8 +4210,8 @@
         </p:blipFill>
         <p:spPr>
           <a:xfrm>
-            <a:off x="5940658" y="2268367"/>
-            <a:ext cx="6346216" cy="4759663"/>
+            <a:off x="476275" y="2603500"/>
+            <a:ext cx="7028159" cy="5271120"/>
           </a:xfrm>
           <a:prstGeom prst="rect">
             <a:avLst/>
@@ -2831,16 +4260,31 @@
           </a:prstGeom>
         </p:spPr>
         <p:txBody>
-          <a:bodyPr/>
+          <a:bodyPr>
+            <a:normAutofit/>
+          </a:bodyPr>
           <a:lstStyle/>
           <a:p>
             <a:pPr lvl="0">
               <a:defRPr sz="1800"/>
             </a:pPr>
             <a:r>
-              <a:rPr sz="8000"/>
-              <a:t>What is Bootstrap</a:t>
-            </a:r>
+              <a:rPr lang="de-DE" sz="6000" dirty="0" err="1" smtClean="0"/>
+              <a:t>Application</a:t>
+            </a:r>
+            <a:r>
+              <a:rPr lang="de-DE" sz="6000" dirty="0" smtClean="0"/>
+              <a:t> </a:t>
+            </a:r>
+            <a:r>
+              <a:rPr lang="de-DE" sz="6000" dirty="0" err="1" smtClean="0"/>
+              <a:t>of</a:t>
+            </a:r>
+            <a:r>
+              <a:rPr sz="6000" dirty="0" smtClean="0"/>
+              <a:t> Bootstrap</a:t>
+            </a:r>
+            <a:endParaRPr sz="6000" dirty="0"/>
           </a:p>
         </p:txBody>
       </p:sp>
@@ -2867,36 +4311,14 @@
               <a:defRPr sz="1800"/>
             </a:pPr>
             <a:r>
-              <a:rPr sz="3600"/>
-              <a:t>practice to estimate properties of an estimator</a:t>
-            </a:r>
-          </a:p>
-          <a:p>
-            <a:pPr lvl="1">
-              <a:defRPr sz="1800"/>
-            </a:pPr>
-            <a:r>
-              <a:rPr sz="3600"/>
-              <a:t>for example the variance</a:t>
-            </a:r>
-          </a:p>
-          <a:p>
-            <a:pPr lvl="0">
-              <a:defRPr sz="1800"/>
-            </a:pPr>
-            <a:r>
-              <a:rPr sz="3600"/>
-              <a:t>samples from sample</a:t>
-            </a:r>
-          </a:p>
-          <a:p>
-            <a:pPr lvl="0">
-              <a:defRPr sz="1800"/>
-            </a:pPr>
-            <a:r>
-              <a:rPr sz="3600"/>
-              <a:t>… maybe with formula</a:t>
-            </a:r>
+              <a:rPr lang="de-DE" sz="3600" dirty="0" smtClean="0"/>
+              <a:t>PSEUDO CODE OF </a:t>
+            </a:r>
+            <a:r>
+              <a:rPr lang="de-DE" sz="3600" dirty="0" err="1" smtClean="0"/>
+              <a:t>BOOTSTRAPt</a:t>
+            </a:r>
+            <a:endParaRPr sz="3600" dirty="0"/>
           </a:p>
         </p:txBody>
       </p:sp>
@@ -2942,16 +4364,39 @@
           </a:prstGeom>
         </p:spPr>
         <p:txBody>
-          <a:bodyPr/>
+          <a:bodyPr>
+            <a:normAutofit/>
+          </a:bodyPr>
           <a:lstStyle/>
           <a:p>
             <a:pPr lvl="0">
               <a:defRPr sz="1800"/>
             </a:pPr>
             <a:r>
-              <a:rPr sz="8000"/>
-              <a:t>Idea</a:t>
-            </a:r>
+              <a:rPr lang="de-DE" sz="6000" dirty="0" err="1" smtClean="0"/>
+              <a:t>Why</a:t>
+            </a:r>
+            <a:r>
+              <a:rPr lang="de-DE" sz="6000" dirty="0" smtClean="0"/>
+              <a:t> </a:t>
+            </a:r>
+            <a:r>
+              <a:rPr lang="de-DE" sz="6000" dirty="0" err="1" smtClean="0"/>
+              <a:t>use</a:t>
+            </a:r>
+            <a:r>
+              <a:rPr lang="de-DE" sz="6000" dirty="0" smtClean="0"/>
+              <a:t> </a:t>
+            </a:r>
+            <a:r>
+              <a:rPr lang="de-DE" sz="6000" dirty="0" err="1" smtClean="0"/>
+              <a:t>distance</a:t>
+            </a:r>
+            <a:r>
+              <a:rPr lang="de-DE" sz="6000" dirty="0" smtClean="0"/>
+              <a:t>?</a:t>
+            </a:r>
+            <a:endParaRPr sz="6000" dirty="0"/>
           </a:p>
         </p:txBody>
       </p:sp>
@@ -2963,7 +4408,7 @@
         </p:nvSpPr>
         <p:spPr>
           <a:xfrm flipV="1">
-            <a:off x="2970783" y="4319885"/>
+            <a:off x="5392985" y="6232521"/>
             <a:ext cx="6659315" cy="2866430"/>
           </a:xfrm>
           <a:prstGeom prst="line">
@@ -2993,7 +4438,7 @@
         </p:nvSpPr>
         <p:spPr>
           <a:xfrm flipV="1">
-            <a:off x="2928763" y="5505747"/>
+            <a:off x="5350965" y="7418383"/>
             <a:ext cx="6743354" cy="494706"/>
           </a:xfrm>
           <a:prstGeom prst="line">
@@ -3025,7 +4470,7 @@
         </p:nvSpPr>
         <p:spPr>
           <a:xfrm flipV="1">
-            <a:off x="2754337" y="4817169"/>
+            <a:off x="5176539" y="6729805"/>
             <a:ext cx="7092207" cy="1871862"/>
           </a:xfrm>
           <a:prstGeom prst="line">
@@ -3057,7 +4502,7 @@
         </p:nvSpPr>
         <p:spPr>
           <a:xfrm>
-            <a:off x="7355954" y="3380329"/>
+            <a:off x="9778156" y="5292965"/>
             <a:ext cx="163116" cy="151062"/>
           </a:xfrm>
           <a:custGeom>
@@ -3135,7 +4580,7 @@
         </p:nvSpPr>
         <p:spPr>
           <a:xfrm flipH="1" flipV="1">
-            <a:off x="7465417" y="3547119"/>
+            <a:off x="9887619" y="5459755"/>
             <a:ext cx="658813" cy="1445172"/>
           </a:xfrm>
           <a:prstGeom prst="line">
@@ -3168,7 +4613,7 @@
         </p:nvSpPr>
         <p:spPr>
           <a:xfrm flipH="1" flipV="1">
-            <a:off x="7442299" y="3489176"/>
+            <a:off x="9864501" y="5401812"/>
             <a:ext cx="495252" cy="1848248"/>
           </a:xfrm>
           <a:prstGeom prst="line">
@@ -3203,7 +4648,7 @@
         </p:nvSpPr>
         <p:spPr>
           <a:xfrm flipH="1" flipV="1">
-            <a:off x="7427118" y="3544396"/>
+            <a:off x="9849320" y="5457032"/>
             <a:ext cx="118760" cy="2105120"/>
           </a:xfrm>
           <a:prstGeom prst="line">
@@ -3232,104 +4677,246 @@
       </p:sp>
       <p:sp>
         <p:nvSpPr>
-          <p:cNvPr id="10" name="Shape 52"/>
-          <p:cNvSpPr/>
-          <p:nvPr/>
+          <p:cNvPr id="15" name="Shape 40"/>
+          <p:cNvSpPr>
+            <a:spLocks noGrp="1"/>
+          </p:cNvSpPr>
+          <p:nvPr>
+            <p:ph type="body" idx="1"/>
+          </p:nvPr>
         </p:nvSpPr>
         <p:spPr>
-          <a:xfrm rot="-3960000" flipH="1" flipV="1">
-            <a:off x="7360519" y="6632053"/>
-            <a:ext cx="658813" cy="1445172"/>
+          <a:xfrm>
+            <a:off x="1136335" y="3391994"/>
+            <a:ext cx="6784092" cy="3485248"/>
           </a:xfrm>
-          <a:prstGeom prst="line">
+          <a:prstGeom prst="rect">
             <a:avLst/>
           </a:prstGeom>
-          <a:ln w="38100" cap="rnd">
-            <a:solidFill/>
-            <a:custDash>
-              <a:ds d="100000" sp="200000"/>
-            </a:custDash>
-            <a:miter lim="400000"/>
-          </a:ln>
         </p:spPr>
         <p:txBody>
-          <a:bodyPr lIns="50800" tIns="50800" rIns="50800" bIns="50800" anchor="ctr"/>
+          <a:bodyPr>
+            <a:normAutofit/>
+          </a:bodyPr>
           <a:lstStyle/>
           <a:p>
-            <a:pPr lvl="0">
-              <a:defRPr sz="2400"/>
-            </a:pPr>
-            <a:endParaRPr/>
-          </a:p>
-        </p:txBody>
-      </p:sp>
-      <p:sp>
-        <p:nvSpPr>
-          <p:cNvPr id="11" name="Shape 53"/>
-          <p:cNvSpPr/>
-          <p:nvPr/>
-        </p:nvSpPr>
-        <p:spPr>
-          <a:xfrm rot="6300000" flipH="1" flipV="1">
-            <a:off x="7689924" y="6716000"/>
-            <a:ext cx="495252" cy="1848248"/>
-          </a:xfrm>
-          <a:prstGeom prst="line">
-            <a:avLst/>
-          </a:prstGeom>
-          <a:ln w="38100" cap="rnd">
-            <a:solidFill>
-              <a:srgbClr val="BD5B0C"/>
-            </a:solidFill>
-            <a:custDash>
-              <a:ds d="100000" sp="200000"/>
-            </a:custDash>
-            <a:miter lim="400000"/>
-          </a:ln>
-        </p:spPr>
-        <p:txBody>
-          <a:bodyPr lIns="0" tIns="0" rIns="0" bIns="0" anchor="ctr"/>
-          <a:lstStyle/>
-          <a:p>
-            <a:pPr lvl="0">
-              <a:defRPr sz="2400"/>
-            </a:pPr>
-            <a:endParaRPr/>
-          </a:p>
-        </p:txBody>
-      </p:sp>
-      <p:sp>
-        <p:nvSpPr>
-          <p:cNvPr id="12" name="Shape 54"/>
-          <p:cNvSpPr/>
-          <p:nvPr/>
-        </p:nvSpPr>
-        <p:spPr>
-          <a:xfrm rot="5580000" flipH="1" flipV="1">
-            <a:off x="7975668" y="6867037"/>
-            <a:ext cx="118760" cy="2105120"/>
-          </a:xfrm>
-          <a:prstGeom prst="line">
-            <a:avLst/>
-          </a:prstGeom>
-          <a:ln w="38100" cap="rnd">
-            <a:solidFill>
-              <a:srgbClr val="00882B"/>
-            </a:solidFill>
-            <a:custDash>
-              <a:ds d="100000" sp="200000"/>
-            </a:custDash>
-            <a:miter lim="400000"/>
-          </a:ln>
-        </p:spPr>
-        <p:txBody>
-          <a:bodyPr lIns="0" tIns="0" rIns="0" bIns="0" anchor="ctr"/>
-          <a:lstStyle/>
-          <a:p>
-            <a:pPr lvl="0">
-              <a:defRPr sz="2400"/>
-            </a:pPr>
-            <a:endParaRPr/>
+            <a:pPr marL="342264" lvl="0" indent="-342264" defTabSz="449833">
+              <a:spcBef>
+                <a:spcPts val="3200"/>
+              </a:spcBef>
+              <a:defRPr sz="1800"/>
+            </a:pPr>
+            <a:r>
+              <a:rPr lang="de-DE" sz="2772" b="1" dirty="0" smtClean="0"/>
+              <a:t>Problem</a:t>
+            </a:r>
+            <a:r>
+              <a:rPr lang="de-DE" sz="2772" dirty="0" smtClean="0"/>
+              <a:t>: </a:t>
+            </a:r>
+            <a:r>
+              <a:rPr lang="de-DE" sz="2772" dirty="0" err="1" smtClean="0"/>
+              <a:t>Predictions</a:t>
+            </a:r>
+            <a:r>
+              <a:rPr lang="de-DE" sz="2772" dirty="0" smtClean="0"/>
+              <a:t> </a:t>
+            </a:r>
+            <a:r>
+              <a:rPr lang="de-DE" sz="2772" dirty="0" err="1" smtClean="0"/>
+              <a:t>are</a:t>
+            </a:r>
+            <a:r>
+              <a:rPr lang="de-DE" sz="2772" dirty="0" smtClean="0"/>
+              <a:t> </a:t>
+            </a:r>
+            <a:r>
+              <a:rPr lang="de-DE" sz="2772" dirty="0" err="1" smtClean="0"/>
+              <a:t>only</a:t>
+            </a:r>
+            <a:r>
+              <a:rPr lang="de-DE" sz="2772" dirty="0" smtClean="0"/>
+              <a:t> </a:t>
+            </a:r>
+            <a:r>
+              <a:rPr lang="de-DE" sz="2772" dirty="0" err="1" smtClean="0"/>
+              <a:t>binary</a:t>
+            </a:r>
+            <a:r>
+              <a:rPr lang="de-DE" sz="2772" dirty="0" smtClean="0"/>
+              <a:t> variables</a:t>
+            </a:r>
+            <a:r>
+              <a:rPr lang="de-DE" sz="2772" dirty="0"/>
+              <a:t> </a:t>
+            </a:r>
+            <a:r>
+              <a:rPr lang="de-DE" sz="2772" dirty="0" err="1" smtClean="0"/>
+              <a:t>and</a:t>
+            </a:r>
+            <a:r>
+              <a:rPr lang="de-DE" sz="2772" dirty="0" smtClean="0"/>
+              <a:t> </a:t>
+            </a:r>
+            <a:r>
+              <a:rPr lang="de-DE" sz="2772" dirty="0" err="1" smtClean="0"/>
+              <a:t>therefore</a:t>
+            </a:r>
+            <a:r>
+              <a:rPr lang="de-DE" sz="2772" dirty="0" smtClean="0"/>
+              <a:t> </a:t>
+            </a:r>
+            <a:r>
+              <a:rPr lang="de-DE" sz="2772" dirty="0" err="1" smtClean="0"/>
+              <a:t>might</a:t>
+            </a:r>
+            <a:r>
+              <a:rPr lang="de-DE" sz="2772" dirty="0" smtClean="0"/>
+              <a:t> </a:t>
+            </a:r>
+            <a:r>
+              <a:rPr lang="de-DE" sz="2772" dirty="0" err="1" smtClean="0"/>
+              <a:t>be</a:t>
+            </a:r>
+            <a:r>
+              <a:rPr lang="de-DE" sz="2772" dirty="0" smtClean="0"/>
+              <a:t> </a:t>
+            </a:r>
+            <a:r>
+              <a:rPr lang="de-DE" sz="2772" dirty="0" err="1" smtClean="0"/>
+              <a:t>identical</a:t>
+            </a:r>
+            <a:r>
+              <a:rPr lang="de-DE" sz="2772" dirty="0"/>
+              <a:t> </a:t>
+            </a:r>
+            <a:r>
+              <a:rPr lang="de-DE" sz="2772" dirty="0" err="1" smtClean="0"/>
+              <a:t>across</a:t>
+            </a:r>
+            <a:r>
+              <a:rPr lang="de-DE" sz="2772" dirty="0" smtClean="0"/>
+              <a:t> all </a:t>
+            </a:r>
+            <a:r>
+              <a:rPr lang="de-DE" sz="2772" dirty="0" err="1" smtClean="0"/>
+              <a:t>bootstrap</a:t>
+            </a:r>
+            <a:r>
+              <a:rPr lang="de-DE" sz="2772" dirty="0" smtClean="0"/>
+              <a:t> </a:t>
+            </a:r>
+            <a:r>
+              <a:rPr lang="de-DE" sz="2772" dirty="0" err="1" smtClean="0"/>
+              <a:t>samples</a:t>
+            </a:r>
+            <a:endParaRPr lang="de-DE" sz="2772" dirty="0" smtClean="0"/>
+          </a:p>
+          <a:p>
+            <a:pPr marL="342264" lvl="0" indent="-342264" defTabSz="449833">
+              <a:spcBef>
+                <a:spcPts val="3200"/>
+              </a:spcBef>
+              <a:defRPr sz="1800"/>
+            </a:pPr>
+            <a:r>
+              <a:rPr lang="de-DE" sz="2772" b="1" dirty="0" smtClean="0"/>
+              <a:t>Solution</a:t>
+            </a:r>
+            <a:r>
+              <a:rPr lang="de-DE" sz="2772" dirty="0" smtClean="0"/>
+              <a:t>: </a:t>
+            </a:r>
+            <a:r>
+              <a:rPr lang="de-DE" sz="2772" dirty="0" err="1" smtClean="0"/>
+              <a:t>Use</a:t>
+            </a:r>
+            <a:r>
+              <a:rPr lang="de-DE" sz="2772" dirty="0" smtClean="0"/>
+              <a:t> minimal </a:t>
+            </a:r>
+            <a:r>
+              <a:rPr lang="de-DE" sz="2772" dirty="0" err="1" smtClean="0"/>
+              <a:t>distance</a:t>
+            </a:r>
+            <a:r>
+              <a:rPr lang="de-DE" sz="2772" dirty="0" smtClean="0"/>
+              <a:t> </a:t>
+            </a:r>
+            <a:r>
+              <a:rPr lang="de-DE" sz="2772" dirty="0" err="1" smtClean="0"/>
+              <a:t>of</a:t>
+            </a:r>
+            <a:r>
+              <a:rPr lang="de-DE" sz="2772" dirty="0" smtClean="0"/>
+              <a:t> </a:t>
+            </a:r>
+            <a:r>
+              <a:rPr lang="de-DE" sz="2772" dirty="0" err="1" smtClean="0"/>
+              <a:t>predictionpoint</a:t>
+            </a:r>
+            <a:r>
+              <a:rPr lang="de-DE" sz="2772" dirty="0" smtClean="0"/>
+              <a:t> </a:t>
+            </a:r>
+            <a:r>
+              <a:rPr lang="de-DE" sz="2772" dirty="0" err="1" smtClean="0"/>
+              <a:t>to</a:t>
+            </a:r>
+            <a:r>
+              <a:rPr lang="de-DE" sz="2772" dirty="0" smtClean="0"/>
+              <a:t> </a:t>
+            </a:r>
+            <a:r>
+              <a:rPr lang="de-DE" sz="2772" dirty="0" err="1" smtClean="0"/>
+              <a:t>decision</a:t>
+            </a:r>
+            <a:r>
+              <a:rPr lang="de-DE" sz="2772" dirty="0" smtClean="0"/>
+              <a:t> </a:t>
+            </a:r>
+            <a:r>
+              <a:rPr lang="de-DE" sz="2772" dirty="0" err="1" smtClean="0"/>
+              <a:t>boundary</a:t>
+            </a:r>
+            <a:r>
+              <a:rPr lang="de-DE" sz="2772" dirty="0" smtClean="0"/>
+              <a:t> </a:t>
+            </a:r>
+            <a:r>
+              <a:rPr lang="de-DE" sz="2772" dirty="0" err="1" smtClean="0"/>
+              <a:t>as</a:t>
+            </a:r>
+            <a:r>
+              <a:rPr lang="de-DE" sz="2772" dirty="0" smtClean="0"/>
+              <a:t> real </a:t>
+            </a:r>
+            <a:r>
+              <a:rPr lang="de-DE" sz="2772" dirty="0" err="1" smtClean="0"/>
+              <a:t>valued</a:t>
+            </a:r>
+            <a:r>
+              <a:rPr lang="de-DE" sz="2772" dirty="0" smtClean="0"/>
+              <a:t> </a:t>
+            </a:r>
+            <a:r>
+              <a:rPr lang="de-DE" sz="2772" dirty="0" err="1" smtClean="0"/>
+              <a:t>substitue</a:t>
+            </a:r>
+            <a:r>
+              <a:rPr lang="de-DE" sz="2772" dirty="0" smtClean="0"/>
+              <a:t> </a:t>
+            </a:r>
+            <a:endParaRPr sz="2772" dirty="0"/>
+          </a:p>
+          <a:p>
+            <a:pPr marL="342264" lvl="0" indent="-342264" defTabSz="449833">
+              <a:spcBef>
+                <a:spcPts val="3200"/>
+              </a:spcBef>
+              <a:defRPr sz="1800"/>
+            </a:pPr>
+            <a:endParaRPr sz="2772" dirty="0"/>
           </a:p>
         </p:txBody>
       </p:sp>
@@ -3386,9 +4973,10 @@
               <a:defRPr sz="1800"/>
             </a:pPr>
             <a:r>
-              <a:rPr sz="8000"/>
-              <a:t>Idea</a:t>
-            </a:r>
+              <a:rPr lang="de-DE" sz="6000" dirty="0" err="1" smtClean="0"/>
+              <a:t>Example</a:t>
+            </a:r>
+            <a:endParaRPr sz="6000" dirty="0"/>
           </a:p>
         </p:txBody>
       </p:sp>
@@ -3604,7 +5192,7 @@
         </p:blipFill>
         <p:spPr>
           <a:xfrm>
-            <a:off x="7678606" y="2165718"/>
+            <a:off x="7540584" y="2208995"/>
             <a:ext cx="3916947" cy="2937710"/>
           </a:xfrm>
           <a:prstGeom prst="rect">
@@ -3721,7 +5309,7 @@
               <a:defRPr sz="1800"/>
             </a:pPr>
             <a:r>
-              <a:rPr sz="8000"/>
+              <a:rPr sz="6000" dirty="0"/>
               <a:t>Implementation</a:t>
             </a:r>
           </a:p>
@@ -3750,7 +5338,7 @@
               <a:defRPr sz="1800"/>
             </a:pPr>
             <a:r>
-              <a:rPr sz="3600"/>
+              <a:rPr sz="3600" dirty="0"/>
               <a:t>what we did</a:t>
             </a:r>
           </a:p>
@@ -3759,7 +5347,7 @@
               <a:defRPr sz="1800"/>
             </a:pPr>
             <a:r>
-              <a:rPr sz="3600"/>
+              <a:rPr sz="3600" dirty="0"/>
               <a:t>keine Ahnung was wir da genau hinschreiben. uns fällt was ein</a:t>
             </a:r>
           </a:p>
@@ -3891,14 +5479,16 @@
           </a:prstGeom>
         </p:spPr>
         <p:txBody>
-          <a:bodyPr/>
+          <a:bodyPr>
+            <a:normAutofit/>
+          </a:bodyPr>
           <a:lstStyle/>
           <a:p>
             <a:pPr lvl="0">
               <a:defRPr sz="1800"/>
             </a:pPr>
             <a:r>
-              <a:rPr sz="8000"/>
+              <a:rPr sz="6000" dirty="0"/>
               <a:t>What we found out</a:t>
             </a:r>
           </a:p>

</xml_diff>